<commit_message>
Add slide for current position
</commit_message>
<xml_diff>
--- a/images/Resume Images.pptx
+++ b/images/Resume Images.pptx
@@ -6,13 +6,14 @@
   </p:sldMasterIdLst>
   <p:sldIdLst>
     <p:sldId id="257" r:id="rId2"/>
-    <p:sldId id="258" r:id="rId3"/>
-    <p:sldId id="259" r:id="rId4"/>
-    <p:sldId id="260" r:id="rId5"/>
-    <p:sldId id="261" r:id="rId6"/>
-    <p:sldId id="262" r:id="rId7"/>
-    <p:sldId id="263" r:id="rId8"/>
-    <p:sldId id="264" r:id="rId9"/>
+    <p:sldId id="265" r:id="rId3"/>
+    <p:sldId id="258" r:id="rId4"/>
+    <p:sldId id="259" r:id="rId5"/>
+    <p:sldId id="260" r:id="rId6"/>
+    <p:sldId id="261" r:id="rId7"/>
+    <p:sldId id="262" r:id="rId8"/>
+    <p:sldId id="263" r:id="rId9"/>
+    <p:sldId id="264" r:id="rId10"/>
   </p:sldIdLst>
   <p:sldSz cx="12192000" cy="6858000"/>
   <p:notesSz cx="6858000" cy="9144000"/>
@@ -266,7 +267,7 @@
           <a:p>
             <a:fld id="{D1DD90AC-BFF5-464B-841F-7B23EE4D068F}" type="datetimeFigureOut">
               <a:rPr lang="en-US" smtClean="0"/>
-              <a:t>11/29/22</a:t>
+              <a:t>4/22/25</a:t>
             </a:fld>
             <a:endParaRPr lang="en-US"/>
           </a:p>
@@ -464,7 +465,7 @@
           <a:p>
             <a:fld id="{D1DD90AC-BFF5-464B-841F-7B23EE4D068F}" type="datetimeFigureOut">
               <a:rPr lang="en-US" smtClean="0"/>
-              <a:t>11/29/22</a:t>
+              <a:t>4/22/25</a:t>
             </a:fld>
             <a:endParaRPr lang="en-US"/>
           </a:p>
@@ -672,7 +673,7 @@
           <a:p>
             <a:fld id="{D1DD90AC-BFF5-464B-841F-7B23EE4D068F}" type="datetimeFigureOut">
               <a:rPr lang="en-US" smtClean="0"/>
-              <a:t>11/29/22</a:t>
+              <a:t>4/22/25</a:t>
             </a:fld>
             <a:endParaRPr lang="en-US"/>
           </a:p>
@@ -870,7 +871,7 @@
           <a:p>
             <a:fld id="{D1DD90AC-BFF5-464B-841F-7B23EE4D068F}" type="datetimeFigureOut">
               <a:rPr lang="en-US" smtClean="0"/>
-              <a:t>11/29/22</a:t>
+              <a:t>4/22/25</a:t>
             </a:fld>
             <a:endParaRPr lang="en-US"/>
           </a:p>
@@ -1145,7 +1146,7 @@
           <a:p>
             <a:fld id="{D1DD90AC-BFF5-464B-841F-7B23EE4D068F}" type="datetimeFigureOut">
               <a:rPr lang="en-US" smtClean="0"/>
-              <a:t>11/29/22</a:t>
+              <a:t>4/22/25</a:t>
             </a:fld>
             <a:endParaRPr lang="en-US"/>
           </a:p>
@@ -1410,7 +1411,7 @@
           <a:p>
             <a:fld id="{D1DD90AC-BFF5-464B-841F-7B23EE4D068F}" type="datetimeFigureOut">
               <a:rPr lang="en-US" smtClean="0"/>
-              <a:t>11/29/22</a:t>
+              <a:t>4/22/25</a:t>
             </a:fld>
             <a:endParaRPr lang="en-US"/>
           </a:p>
@@ -1822,7 +1823,7 @@
           <a:p>
             <a:fld id="{D1DD90AC-BFF5-464B-841F-7B23EE4D068F}" type="datetimeFigureOut">
               <a:rPr lang="en-US" smtClean="0"/>
-              <a:t>11/29/22</a:t>
+              <a:t>4/22/25</a:t>
             </a:fld>
             <a:endParaRPr lang="en-US"/>
           </a:p>
@@ -1963,7 +1964,7 @@
           <a:p>
             <a:fld id="{D1DD90AC-BFF5-464B-841F-7B23EE4D068F}" type="datetimeFigureOut">
               <a:rPr lang="en-US" smtClean="0"/>
-              <a:t>11/29/22</a:t>
+              <a:t>4/22/25</a:t>
             </a:fld>
             <a:endParaRPr lang="en-US"/>
           </a:p>
@@ -2076,7 +2077,7 @@
           <a:p>
             <a:fld id="{D1DD90AC-BFF5-464B-841F-7B23EE4D068F}" type="datetimeFigureOut">
               <a:rPr lang="en-US" smtClean="0"/>
-              <a:t>11/29/22</a:t>
+              <a:t>4/22/25</a:t>
             </a:fld>
             <a:endParaRPr lang="en-US"/>
           </a:p>
@@ -2387,7 +2388,7 @@
           <a:p>
             <a:fld id="{D1DD90AC-BFF5-464B-841F-7B23EE4D068F}" type="datetimeFigureOut">
               <a:rPr lang="en-US" smtClean="0"/>
-              <a:t>11/29/22</a:t>
+              <a:t>4/22/25</a:t>
             </a:fld>
             <a:endParaRPr lang="en-US"/>
           </a:p>
@@ -2675,7 +2676,7 @@
           <a:p>
             <a:fld id="{D1DD90AC-BFF5-464B-841F-7B23EE4D068F}" type="datetimeFigureOut">
               <a:rPr lang="en-US" smtClean="0"/>
-              <a:t>11/29/22</a:t>
+              <a:t>4/22/25</a:t>
             </a:fld>
             <a:endParaRPr lang="en-US"/>
           </a:p>
@@ -2916,7 +2917,7 @@
           <a:p>
             <a:fld id="{D1DD90AC-BFF5-464B-841F-7B23EE4D068F}" type="datetimeFigureOut">
               <a:rPr lang="en-US" smtClean="0"/>
-              <a:t>11/29/22</a:t>
+              <a:t>4/22/25</a:t>
             </a:fld>
             <a:endParaRPr lang="en-US"/>
           </a:p>
@@ -3682,7 +3683,7 @@
         <p:spPr>
           <a:xfrm>
             <a:off x="804672" y="640080"/>
-            <a:ext cx="3282696" cy="5257800"/>
+            <a:ext cx="3399028" cy="5257800"/>
           </a:xfrm>
         </p:spPr>
         <p:txBody>
@@ -3699,7 +3700,7 @@
                 <a:latin typeface="Source Sans Pro" panose="020B0503030403020204" pitchFamily="34" charset="0"/>
                 <a:ea typeface="Source Sans Pro" panose="020B0503030403020204" pitchFamily="34" charset="0"/>
               </a:rPr>
-              <a:t>Inflight Operations Intern</a:t>
+              <a:t>Continuous Improvement Manager</a:t>
             </a:r>
           </a:p>
         </p:txBody>
@@ -3728,7 +3729,7 @@
         </p:spPr>
         <p:txBody>
           <a:bodyPr anchor="ctr">
-            <a:normAutofit/>
+            <a:normAutofit fontScale="92500"/>
           </a:bodyPr>
           <a:lstStyle/>
           <a:p>
@@ -3749,7 +3750,7 @@
                 <a:ea typeface="Source Sans Pro" panose="020B0503030403020204" pitchFamily="34" charset="0"/>
                 <a:cs typeface="Times New Roman" panose="02020603050405020304" pitchFamily="18" charset="0"/>
               </a:rPr>
-              <a:t>Selected from extremely competitive applicant pool to enhance inflight operations in Frontier’s main hub</a:t>
+              <a:t>Designed and built insightful dashboards for key stakeholders to facilitate data-driven decision making</a:t>
             </a:r>
           </a:p>
           <a:p>
@@ -3788,8 +3789,22 @@
                 <a:ea typeface="Source Sans Pro" panose="020B0503030403020204" pitchFamily="34" charset="0"/>
                 <a:cs typeface="Times New Roman" panose="02020603050405020304" pitchFamily="18" charset="0"/>
               </a:rPr>
-              <a:t>Performed extensive data analysis to enhance airline operations and corporate systems</a:t>
-            </a:r>
+              <a:t>Streamlined dail</a:t>
+            </a:r>
+            <a:r>
+              <a:rPr lang="en-US" sz="2000" dirty="0">
+                <a:latin typeface="Source Sans Pro" panose="020B0503030403020204" pitchFamily="34" charset="0"/>
+                <a:ea typeface="Source Sans Pro" panose="020B0503030403020204" pitchFamily="34" charset="0"/>
+                <a:cs typeface="Times New Roman" panose="02020603050405020304" pitchFamily="18" charset="0"/>
+              </a:rPr>
+              <a:t>y processes through automation technology and process optimization leadership</a:t>
+            </a:r>
+            <a:endParaRPr lang="en-US" sz="2000" dirty="0">
+              <a:effectLst/>
+              <a:latin typeface="Source Sans Pro" panose="020B0503030403020204" pitchFamily="34" charset="0"/>
+              <a:ea typeface="Source Sans Pro" panose="020B0503030403020204" pitchFamily="34" charset="0"/>
+              <a:cs typeface="Times New Roman" panose="02020603050405020304" pitchFamily="18" charset="0"/>
+            </a:endParaRPr>
           </a:p>
           <a:p>
             <a:pPr marL="342900" marR="0" lvl="0" indent="-342900">
@@ -3827,7 +3842,7 @@
                 <a:ea typeface="Source Sans Pro" panose="020B0503030403020204" pitchFamily="34" charset="0"/>
                 <a:cs typeface="Times New Roman" panose="02020603050405020304" pitchFamily="18" charset="0"/>
               </a:rPr>
-              <a:t>Overhauled complex logistical network to oversee distribution of over 500 crew badges nationwide </a:t>
+              <a:t>Implemented ERP data and query upgrades to improve speed by over 50% + security</a:t>
             </a:r>
           </a:p>
           <a:p>
@@ -3866,7 +3881,7 @@
                 <a:ea typeface="Source Sans Pro" panose="020B0503030403020204" pitchFamily="34" charset="0"/>
                 <a:cs typeface="Times New Roman" panose="02020603050405020304" pitchFamily="18" charset="0"/>
               </a:rPr>
-              <a:t>Diagnosed and targeted operational inefficiencies to conserve and streamline company resources</a:t>
+              <a:t>Applied advanced data analytics skills in developing automated financial tools using Python and SQL</a:t>
             </a:r>
           </a:p>
           <a:p>
@@ -3905,7 +3920,7 @@
                 <a:ea typeface="Source Sans Pro" panose="020B0503030403020204" pitchFamily="34" charset="0"/>
                 <a:cs typeface="Times New Roman" panose="02020603050405020304" pitchFamily="18" charset="0"/>
               </a:rPr>
-              <a:t>Worked with over 500 flight attendants &amp; visited planes daily to ensure smooth operations</a:t>
+              <a:t>Directly and indirectly managed dozens of individuals across 4 locations in 2 countries while routinely coordinating with other department heads and executive leadership, demonstrating strong leadership and effective communication skills</a:t>
             </a:r>
           </a:p>
         </p:txBody>
@@ -3925,7 +3940,7 @@
         <p:spPr>
           <a:xfrm>
             <a:off x="804672" y="4252198"/>
-            <a:ext cx="3612583" cy="369332"/>
+            <a:ext cx="3612583" cy="646331"/>
           </a:xfrm>
           <a:prstGeom prst="rect">
             <a:avLst/>
@@ -3946,7 +3961,19 @@
                 <a:latin typeface="Source Sans Pro" panose="020B0503030403020204" pitchFamily="34" charset="0"/>
                 <a:ea typeface="Source Sans Pro" panose="020B0503030403020204" pitchFamily="34" charset="0"/>
               </a:rPr>
-              <a:t>Frontier Airlines | Denver, Colorado</a:t>
+              <a:t>New-Indy Packaging | </a:t>
+            </a:r>
+          </a:p>
+          <a:p>
+            <a:r>
+              <a:rPr lang="en-US" dirty="0">
+                <a:solidFill>
+                  <a:schemeClr val="bg1"/>
+                </a:solidFill>
+                <a:latin typeface="Source Sans Pro" panose="020B0503030403020204" pitchFamily="34" charset="0"/>
+                <a:ea typeface="Source Sans Pro" panose="020B0503030403020204" pitchFamily="34" charset="0"/>
+              </a:rPr>
+              <a:t>Cerritos, CA</a:t>
             </a:r>
           </a:p>
         </p:txBody>
@@ -3989,15 +4016,7 @@
                 <a:latin typeface="Source Sans Pro" panose="020B0503030403020204" pitchFamily="34" charset="0"/>
                 <a:ea typeface="Source Sans Pro" panose="020B0503030403020204" pitchFamily="34" charset="0"/>
               </a:rPr>
-              <a:t>June – September 2022</a:t>
-            </a:r>
-            <a:r>
-              <a:rPr lang="en-US" sz="2400" b="1" dirty="0">
-                <a:effectLst/>
-                <a:latin typeface="Source Sans Pro" panose="020B0503030403020204" pitchFamily="34" charset="0"/>
-                <a:ea typeface="Source Sans Pro" panose="020B0503030403020204" pitchFamily="34" charset="0"/>
-              </a:rPr>
-              <a:t> </a:t>
+              <a:t>December 2023 - Present</a:t>
             </a:r>
             <a:endParaRPr lang="en-US" sz="2400" b="1" dirty="0">
               <a:latin typeface="Source Sans Pro" panose="020B0503030403020204" pitchFamily="34" charset="0"/>
@@ -4032,7 +4051,13 @@
     </p:bg>
     <p:spTree>
       <p:nvGrpSpPr>
-        <p:cNvPr id="1" name=""/>
+        <p:cNvPr id="1" name="">
+          <a:extLst>
+            <a:ext uri="{FF2B5EF4-FFF2-40B4-BE49-F238E27FC236}">
+              <a16:creationId xmlns:a16="http://schemas.microsoft.com/office/drawing/2014/main" id="{9060C512-9D0C-FD5B-BC1A-4A5FA2106F37}"/>
+            </a:ext>
+          </a:extLst>
+        </p:cNvPr>
         <p:cNvGrpSpPr/>
         <p:nvPr/>
       </p:nvGrpSpPr>
@@ -4049,7 +4074,7 @@
           <p:cNvPr id="8" name="Rectangle 7">
             <a:extLst>
               <a:ext uri="{FF2B5EF4-FFF2-40B4-BE49-F238E27FC236}">
-                <a16:creationId xmlns:a16="http://schemas.microsoft.com/office/drawing/2014/main" id="{C7FA33FF-088D-4F16-95A2-2C64D353DEA8}"/>
+                <a16:creationId xmlns:a16="http://schemas.microsoft.com/office/drawing/2014/main" id="{2802E223-CE9B-26FB-A95B-CBE3DDE9AA0E}"/>
               </a:ext>
               <a:ext uri="{C183D7F6-B498-43B3-948B-1728B52AA6E4}">
                 <adec:decorative xmlns:adec="http://schemas.microsoft.com/office/drawing/2017/decorative" val="1"/>
@@ -4138,7 +4163,7 @@
           <p:cNvPr id="10" name="Rectangle 9">
             <a:extLst>
               <a:ext uri="{FF2B5EF4-FFF2-40B4-BE49-F238E27FC236}">
-                <a16:creationId xmlns:a16="http://schemas.microsoft.com/office/drawing/2014/main" id="{A376EFB1-01CF-419F-ABF1-2AF02BBFCBD1}"/>
+                <a16:creationId xmlns:a16="http://schemas.microsoft.com/office/drawing/2014/main" id="{B5EF233A-06C6-B8A0-8EF1-3B1440077533}"/>
               </a:ext>
               <a:ext uri="{C183D7F6-B498-43B3-948B-1728B52AA6E4}">
                 <adec:decorative xmlns:adec="http://schemas.microsoft.com/office/drawing/2017/decorative" val="1"/>
@@ -4232,7 +4257,7 @@
           <p:cNvPr id="12" name="Freeform: Shape 11">
             <a:extLst>
               <a:ext uri="{FF2B5EF4-FFF2-40B4-BE49-F238E27FC236}">
-                <a16:creationId xmlns:a16="http://schemas.microsoft.com/office/drawing/2014/main" id="{FF9DEA15-78BD-4750-AA18-B9F28A6D5AB8}"/>
+                <a16:creationId xmlns:a16="http://schemas.microsoft.com/office/drawing/2014/main" id="{57F540FA-6DF3-05DC-72F4-93D24344F962}"/>
               </a:ext>
               <a:ext uri="{C183D7F6-B498-43B3-948B-1728B52AA6E4}">
                 <adec:decorative xmlns:adec="http://schemas.microsoft.com/office/drawing/2017/decorative" val="1"/>
@@ -4371,7 +4396,7 @@
           <p:cNvPr id="2" name="Title 1">
             <a:extLst>
               <a:ext uri="{FF2B5EF4-FFF2-40B4-BE49-F238E27FC236}">
-                <a16:creationId xmlns:a16="http://schemas.microsoft.com/office/drawing/2014/main" id="{641F7249-356B-E00C-5B30-B265726CAC26}"/>
+                <a16:creationId xmlns:a16="http://schemas.microsoft.com/office/drawing/2014/main" id="{A50DAD75-DFC7-0A6F-8063-6F5EA379A002}"/>
               </a:ext>
             </a:extLst>
           </p:cNvPr>
@@ -4402,7 +4427,7 @@
                 <a:latin typeface="Source Sans Pro" panose="020B0503030403020204" pitchFamily="34" charset="0"/>
                 <a:ea typeface="Source Sans Pro" panose="020B0503030403020204" pitchFamily="34" charset="0"/>
               </a:rPr>
-              <a:t>Deputy Data Director</a:t>
+              <a:t>Inflight Operations Intern</a:t>
             </a:r>
           </a:p>
         </p:txBody>
@@ -4412,7 +4437,7 @@
           <p:cNvPr id="33" name="Content Placeholder 2">
             <a:extLst>
               <a:ext uri="{FF2B5EF4-FFF2-40B4-BE49-F238E27FC236}">
-                <a16:creationId xmlns:a16="http://schemas.microsoft.com/office/drawing/2014/main" id="{9741FF26-BBDD-4A28-26F0-1785A26A82AD}"/>
+                <a16:creationId xmlns:a16="http://schemas.microsoft.com/office/drawing/2014/main" id="{9300182A-1D9D-E772-F65D-A1C33C9FA4F3}"/>
               </a:ext>
             </a:extLst>
           </p:cNvPr>
@@ -4435,52 +4460,38 @@
           </a:bodyPr>
           <a:lstStyle/>
           <a:p>
-            <a:pPr marL="342900" marR="0" lvl="0" indent="-342900" fontAlgn="base">
+            <a:pPr marL="342900" marR="0" lvl="0" indent="-342900">
               <a:spcBef>
                 <a:spcPts val="0"/>
               </a:spcBef>
               <a:spcAft>
-                <a:spcPts val="0"/>
+                <a:spcPts val="600"/>
               </a:spcAft>
-              <a:buSzPts val="1000"/>
               <a:buFont typeface="Symbol" pitchFamily="2" charset="2"/>
               <a:buChar char=""/>
-              <a:tabLst>
-                <a:tab pos="457200" algn="l"/>
-              </a:tabLst>
             </a:pPr>
             <a:r>
               <a:rPr lang="en-US" sz="2000" dirty="0">
-                <a:solidFill>
-                  <a:srgbClr val="000000"/>
-                </a:solidFill>
                 <a:effectLst/>
                 <a:latin typeface="Source Sans Pro" panose="020B0503030403020204" pitchFamily="34" charset="0"/>
                 <a:ea typeface="Source Sans Pro" panose="020B0503030403020204" pitchFamily="34" charset="0"/>
                 <a:cs typeface="Times New Roman" panose="02020603050405020304" pitchFamily="18" charset="0"/>
               </a:rPr>
-              <a:t>Revitalized, managed, updated, and analyzed hundreds of thousands of data weekly</a:t>
-            </a:r>
-          </a:p>
-          <a:p>
-            <a:pPr marL="342900" marR="0" lvl="0" indent="-342900" fontAlgn="base">
+              <a:t>Selected from extremely competitive applicant pool to enhance inflight operations in Frontier’s main hub</a:t>
+            </a:r>
+          </a:p>
+          <a:p>
+            <a:pPr marL="342900" marR="0" lvl="0" indent="-342900">
               <a:spcBef>
                 <a:spcPts val="0"/>
               </a:spcBef>
               <a:spcAft>
-                <a:spcPts val="0"/>
+                <a:spcPts val="600"/>
               </a:spcAft>
-              <a:buSzPts val="1000"/>
               <a:buFont typeface="Symbol" pitchFamily="2" charset="2"/>
               <a:buChar char=""/>
-              <a:tabLst>
-                <a:tab pos="457200" algn="l"/>
-              </a:tabLst>
             </a:pPr>
             <a:endParaRPr lang="en-US" sz="2000" dirty="0">
-              <a:solidFill>
-                <a:srgbClr val="000000"/>
-              </a:solidFill>
               <a:effectLst/>
               <a:latin typeface="Source Sans Pro" panose="020B0503030403020204" pitchFamily="34" charset="0"/>
               <a:ea typeface="Source Sans Pro" panose="020B0503030403020204" pitchFamily="34" charset="0"/>
@@ -4488,52 +4499,38 @@
             </a:endParaRPr>
           </a:p>
           <a:p>
-            <a:pPr marL="342900" marR="0" lvl="0" indent="-342900" fontAlgn="base">
+            <a:pPr marL="342900" marR="0" lvl="0" indent="-342900">
               <a:spcBef>
                 <a:spcPts val="0"/>
               </a:spcBef>
               <a:spcAft>
-                <a:spcPts val="0"/>
+                <a:spcPts val="600"/>
               </a:spcAft>
-              <a:buSzPts val="1000"/>
               <a:buFont typeface="Symbol" pitchFamily="2" charset="2"/>
               <a:buChar char=""/>
-              <a:tabLst>
-                <a:tab pos="457200" algn="l"/>
-              </a:tabLst>
             </a:pPr>
             <a:r>
               <a:rPr lang="en-US" sz="2000" dirty="0">
-                <a:solidFill>
-                  <a:srgbClr val="000000"/>
-                </a:solidFill>
                 <a:effectLst/>
                 <a:latin typeface="Source Sans Pro" panose="020B0503030403020204" pitchFamily="34" charset="0"/>
                 <a:ea typeface="Source Sans Pro" panose="020B0503030403020204" pitchFamily="34" charset="0"/>
                 <a:cs typeface="Times New Roman" panose="02020603050405020304" pitchFamily="18" charset="0"/>
               </a:rPr>
-              <a:t>Oversaw large scale phone banks (5 million+), supporting volunteers experiencing technical difficulties</a:t>
-            </a:r>
-          </a:p>
-          <a:p>
-            <a:pPr marL="342900" marR="0" lvl="0" indent="-342900" fontAlgn="base">
+              <a:t>Performed extensive data analysis to enhance airline operations and corporate systems</a:t>
+            </a:r>
+          </a:p>
+          <a:p>
+            <a:pPr marL="342900" marR="0" lvl="0" indent="-342900">
               <a:spcBef>
                 <a:spcPts val="0"/>
               </a:spcBef>
               <a:spcAft>
-                <a:spcPts val="0"/>
+                <a:spcPts val="600"/>
               </a:spcAft>
-              <a:buSzPts val="1000"/>
               <a:buFont typeface="Symbol" pitchFamily="2" charset="2"/>
               <a:buChar char=""/>
-              <a:tabLst>
-                <a:tab pos="457200" algn="l"/>
-              </a:tabLst>
             </a:pPr>
             <a:endParaRPr lang="en-US" sz="2000" dirty="0">
-              <a:solidFill>
-                <a:srgbClr val="000000"/>
-              </a:solidFill>
               <a:effectLst/>
               <a:latin typeface="Source Sans Pro" panose="020B0503030403020204" pitchFamily="34" charset="0"/>
               <a:ea typeface="Source Sans Pro" panose="020B0503030403020204" pitchFamily="34" charset="0"/>
@@ -4541,31 +4538,102 @@
             </a:endParaRPr>
           </a:p>
           <a:p>
-            <a:pPr marL="342900" marR="0" lvl="0" indent="-342900" fontAlgn="base">
+            <a:pPr marL="342900" marR="0" lvl="0" indent="-342900">
               <a:spcBef>
                 <a:spcPts val="0"/>
               </a:spcBef>
               <a:spcAft>
-                <a:spcPts val="0"/>
+                <a:spcPts val="600"/>
               </a:spcAft>
-              <a:buSzPts val="1000"/>
               <a:buFont typeface="Symbol" pitchFamily="2" charset="2"/>
               <a:buChar char=""/>
-              <a:tabLst>
-                <a:tab pos="457200" algn="l"/>
-              </a:tabLst>
             </a:pPr>
             <a:r>
               <a:rPr lang="en-US" sz="2000" dirty="0">
-                <a:solidFill>
-                  <a:srgbClr val="000000"/>
-                </a:solidFill>
                 <a:effectLst/>
                 <a:latin typeface="Source Sans Pro" panose="020B0503030403020204" pitchFamily="34" charset="0"/>
                 <a:ea typeface="Source Sans Pro" panose="020B0503030403020204" pitchFamily="34" charset="0"/>
                 <a:cs typeface="Times New Roman" panose="02020603050405020304" pitchFamily="18" charset="0"/>
               </a:rPr>
-              <a:t>Recognized and quickly promoted multiple times to perform expanded cross-platform technical duties </a:t>
+              <a:t>Overhauled complex logistical network to oversee distribution of over 500 crew badges nationwide </a:t>
+            </a:r>
+          </a:p>
+          <a:p>
+            <a:pPr marL="342900" marR="0" lvl="0" indent="-342900">
+              <a:spcBef>
+                <a:spcPts val="0"/>
+              </a:spcBef>
+              <a:spcAft>
+                <a:spcPts val="600"/>
+              </a:spcAft>
+              <a:buFont typeface="Symbol" pitchFamily="2" charset="2"/>
+              <a:buChar char=""/>
+            </a:pPr>
+            <a:endParaRPr lang="en-US" sz="2000" dirty="0">
+              <a:effectLst/>
+              <a:latin typeface="Source Sans Pro" panose="020B0503030403020204" pitchFamily="34" charset="0"/>
+              <a:ea typeface="Source Sans Pro" panose="020B0503030403020204" pitchFamily="34" charset="0"/>
+              <a:cs typeface="Times New Roman" panose="02020603050405020304" pitchFamily="18" charset="0"/>
+            </a:endParaRPr>
+          </a:p>
+          <a:p>
+            <a:pPr marL="342900" marR="0" lvl="0" indent="-342900">
+              <a:spcBef>
+                <a:spcPts val="0"/>
+              </a:spcBef>
+              <a:spcAft>
+                <a:spcPts val="600"/>
+              </a:spcAft>
+              <a:buFont typeface="Symbol" pitchFamily="2" charset="2"/>
+              <a:buChar char=""/>
+            </a:pPr>
+            <a:r>
+              <a:rPr lang="en-US" sz="2000" dirty="0">
+                <a:effectLst/>
+                <a:latin typeface="Source Sans Pro" panose="020B0503030403020204" pitchFamily="34" charset="0"/>
+                <a:ea typeface="Source Sans Pro" panose="020B0503030403020204" pitchFamily="34" charset="0"/>
+                <a:cs typeface="Times New Roman" panose="02020603050405020304" pitchFamily="18" charset="0"/>
+              </a:rPr>
+              <a:t>Diagnosed and targeted operational inefficiencies to conserve and streamline company resources</a:t>
+            </a:r>
+          </a:p>
+          <a:p>
+            <a:pPr marL="342900" marR="0" lvl="0" indent="-342900">
+              <a:spcBef>
+                <a:spcPts val="0"/>
+              </a:spcBef>
+              <a:spcAft>
+                <a:spcPts val="600"/>
+              </a:spcAft>
+              <a:buFont typeface="Symbol" pitchFamily="2" charset="2"/>
+              <a:buChar char=""/>
+            </a:pPr>
+            <a:endParaRPr lang="en-US" sz="2000" dirty="0">
+              <a:effectLst/>
+              <a:latin typeface="Source Sans Pro" panose="020B0503030403020204" pitchFamily="34" charset="0"/>
+              <a:ea typeface="Source Sans Pro" panose="020B0503030403020204" pitchFamily="34" charset="0"/>
+              <a:cs typeface="Times New Roman" panose="02020603050405020304" pitchFamily="18" charset="0"/>
+            </a:endParaRPr>
+          </a:p>
+          <a:p>
+            <a:pPr marL="342900" marR="0" lvl="0" indent="-342900">
+              <a:spcBef>
+                <a:spcPts val="0"/>
+              </a:spcBef>
+              <a:spcAft>
+                <a:spcPts val="600"/>
+              </a:spcAft>
+              <a:buFont typeface="Symbol" pitchFamily="2" charset="2"/>
+              <a:buChar char=""/>
+            </a:pPr>
+            <a:r>
+              <a:rPr lang="en-US" sz="2000" dirty="0">
+                <a:effectLst/>
+                <a:latin typeface="Source Sans Pro" panose="020B0503030403020204" pitchFamily="34" charset="0"/>
+                <a:ea typeface="Source Sans Pro" panose="020B0503030403020204" pitchFamily="34" charset="0"/>
+                <a:cs typeface="Times New Roman" panose="02020603050405020304" pitchFamily="18" charset="0"/>
+              </a:rPr>
+              <a:t>Worked with over 500 flight attendants &amp; visited planes daily to ensure smooth operations</a:t>
             </a:r>
           </a:p>
         </p:txBody>
@@ -4575,7 +4643,7 @@
           <p:cNvPr id="17" name="TextBox 16">
             <a:extLst>
               <a:ext uri="{FF2B5EF4-FFF2-40B4-BE49-F238E27FC236}">
-                <a16:creationId xmlns:a16="http://schemas.microsoft.com/office/drawing/2014/main" id="{88FA8BC0-0702-D4C8-3F3B-A680C5702245}"/>
+                <a16:creationId xmlns:a16="http://schemas.microsoft.com/office/drawing/2014/main" id="{320A28EF-27D6-97CE-AC74-6E6BB607810B}"/>
               </a:ext>
             </a:extLst>
           </p:cNvPr>
@@ -4584,8 +4652,8 @@
         </p:nvSpPr>
         <p:spPr>
           <a:xfrm>
-            <a:off x="804672" y="3956770"/>
-            <a:ext cx="3612583" cy="646331"/>
+            <a:off x="804672" y="4252198"/>
+            <a:ext cx="3612583" cy="369332"/>
           </a:xfrm>
           <a:prstGeom prst="rect">
             <a:avLst/>
@@ -4606,7 +4674,7 @@
                 <a:latin typeface="Source Sans Pro" panose="020B0503030403020204" pitchFamily="34" charset="0"/>
                 <a:ea typeface="Source Sans Pro" panose="020B0503030403020204" pitchFamily="34" charset="0"/>
               </a:rPr>
-              <a:t>Harley Rouda for Congress | Newport Beach, CA</a:t>
+              <a:t>Frontier Airlines | Denver, Colorado</a:t>
             </a:r>
           </a:p>
         </p:txBody>
@@ -4616,7 +4684,7 @@
           <p:cNvPr id="19" name="TextBox 18">
             <a:extLst>
               <a:ext uri="{FF2B5EF4-FFF2-40B4-BE49-F238E27FC236}">
-                <a16:creationId xmlns:a16="http://schemas.microsoft.com/office/drawing/2014/main" id="{5C924682-A0E5-2B4A-BCBE-9797662838AA}"/>
+                <a16:creationId xmlns:a16="http://schemas.microsoft.com/office/drawing/2014/main" id="{78D5CDCA-8182-41C9-FDB3-4150FC20C803}"/>
               </a:ext>
             </a:extLst>
           </p:cNvPr>
@@ -4649,35 +4717,10 @@
                 <a:latin typeface="Source Sans Pro" panose="020B0503030403020204" pitchFamily="34" charset="0"/>
                 <a:ea typeface="Source Sans Pro" panose="020B0503030403020204" pitchFamily="34" charset="0"/>
               </a:rPr>
-              <a:t> August </a:t>
-            </a:r>
-            <a:r>
-              <a:rPr lang="en-US" sz="2400" dirty="0">
-                <a:solidFill>
-                  <a:srgbClr val="000000"/>
-                </a:solidFill>
-                <a:effectLst/>
-                <a:latin typeface="Source Sans Pro" panose="020B0503030403020204" pitchFamily="34" charset="0"/>
-                <a:ea typeface="Source Sans Pro" panose="020B0503030403020204" pitchFamily="34" charset="0"/>
-              </a:rPr>
-              <a:t>–</a:t>
+              <a:t>June – September 2022</a:t>
             </a:r>
             <a:r>
               <a:rPr lang="en-US" sz="2400" b="1" dirty="0">
-                <a:solidFill>
-                  <a:srgbClr val="000000"/>
-                </a:solidFill>
-                <a:effectLst/>
-                <a:latin typeface="Source Sans Pro" panose="020B0503030403020204" pitchFamily="34" charset="0"/>
-                <a:ea typeface="Source Sans Pro" panose="020B0503030403020204" pitchFamily="34" charset="0"/>
-              </a:rPr>
-              <a:t> November 2020</a:t>
-            </a:r>
-            <a:r>
-              <a:rPr lang="en-US" sz="2400" i="1" dirty="0">
-                <a:solidFill>
-                  <a:srgbClr val="000000"/>
-                </a:solidFill>
                 <a:effectLst/>
                 <a:latin typeface="Source Sans Pro" panose="020B0503030403020204" pitchFamily="34" charset="0"/>
                 <a:ea typeface="Source Sans Pro" panose="020B0503030403020204" pitchFamily="34" charset="0"/>
@@ -4694,7 +4737,7 @@
     </p:spTree>
     <p:extLst>
       <p:ext uri="{BB962C8B-B14F-4D97-AF65-F5344CB8AC3E}">
-        <p14:creationId xmlns:p14="http://schemas.microsoft.com/office/powerpoint/2010/main" val="811670889"/>
+        <p14:creationId xmlns:p14="http://schemas.microsoft.com/office/powerpoint/2010/main" val="3488592481"/>
       </p:ext>
     </p:extLst>
   </p:cSld>
@@ -5087,7 +5130,7 @@
                 <a:latin typeface="Source Sans Pro" panose="020B0503030403020204" pitchFamily="34" charset="0"/>
                 <a:ea typeface="Source Sans Pro" panose="020B0503030403020204" pitchFamily="34" charset="0"/>
               </a:rPr>
-              <a:t>Physics Learning Assistant</a:t>
+              <a:t>Deputy Data Director</a:t>
             </a:r>
           </a:p>
         </p:txBody>
@@ -5120,15 +5163,19 @@
           </a:bodyPr>
           <a:lstStyle/>
           <a:p>
-            <a:pPr marL="342900" marR="0" lvl="0" indent="-342900">
+            <a:pPr marL="342900" marR="0" lvl="0" indent="-342900" fontAlgn="base">
               <a:spcBef>
                 <a:spcPts val="0"/>
               </a:spcBef>
               <a:spcAft>
                 <a:spcPts val="0"/>
               </a:spcAft>
+              <a:buSzPts val="1000"/>
               <a:buFont typeface="Symbol" pitchFamily="2" charset="2"/>
               <a:buChar char=""/>
+              <a:tabLst>
+                <a:tab pos="457200" algn="l"/>
+              </a:tabLst>
             </a:pPr>
             <a:r>
               <a:rPr lang="en-US" sz="2000" dirty="0">
@@ -5140,21 +5187,28 @@
                 <a:ea typeface="Source Sans Pro" panose="020B0503030403020204" pitchFamily="34" charset="0"/>
                 <a:cs typeface="Times New Roman" panose="02020603050405020304" pitchFamily="18" charset="0"/>
               </a:rPr>
-              <a:t>Assisted peer students in physics learning, experimenting, and assignments </a:t>
-            </a:r>
-          </a:p>
-          <a:p>
-            <a:pPr marL="342900" marR="0" lvl="0" indent="-342900">
+              <a:t>Revitalized, managed, updated, and analyzed hundreds of thousands of data weekly</a:t>
+            </a:r>
+          </a:p>
+          <a:p>
+            <a:pPr marL="342900" marR="0" lvl="0" indent="-342900" fontAlgn="base">
               <a:spcBef>
                 <a:spcPts val="0"/>
               </a:spcBef>
               <a:spcAft>
                 <a:spcPts val="0"/>
               </a:spcAft>
+              <a:buSzPts val="1000"/>
               <a:buFont typeface="Symbol" pitchFamily="2" charset="2"/>
               <a:buChar char=""/>
+              <a:tabLst>
+                <a:tab pos="457200" algn="l"/>
+              </a:tabLst>
             </a:pPr>
             <a:endParaRPr lang="en-US" sz="2000" dirty="0">
+              <a:solidFill>
+                <a:srgbClr val="000000"/>
+              </a:solidFill>
               <a:effectLst/>
               <a:latin typeface="Source Sans Pro" panose="020B0503030403020204" pitchFamily="34" charset="0"/>
               <a:ea typeface="Source Sans Pro" panose="020B0503030403020204" pitchFamily="34" charset="0"/>
@@ -5162,15 +5216,19 @@
             </a:endParaRPr>
           </a:p>
           <a:p>
-            <a:pPr marL="342900" marR="0" lvl="0" indent="-342900">
+            <a:pPr marL="342900" marR="0" lvl="0" indent="-342900" fontAlgn="base">
               <a:spcBef>
                 <a:spcPts val="0"/>
               </a:spcBef>
               <a:spcAft>
                 <a:spcPts val="0"/>
               </a:spcAft>
+              <a:buSzPts val="1000"/>
               <a:buFont typeface="Symbol" pitchFamily="2" charset="2"/>
               <a:buChar char=""/>
+              <a:tabLst>
+                <a:tab pos="457200" algn="l"/>
+              </a:tabLst>
             </a:pPr>
             <a:r>
               <a:rPr lang="en-US" sz="2000" dirty="0">
@@ -5182,21 +5240,28 @@
                 <a:ea typeface="Source Sans Pro" panose="020B0503030403020204" pitchFamily="34" charset="0"/>
                 <a:cs typeface="Times New Roman" panose="02020603050405020304" pitchFamily="18" charset="0"/>
               </a:rPr>
-              <a:t>Undertook concurrent coursework in teaching pedagogy to dynamically improve</a:t>
-            </a:r>
-          </a:p>
-          <a:p>
-            <a:pPr marL="342900" marR="0" lvl="0" indent="-342900">
+              <a:t>Oversaw large scale phone banks (5 million+), supporting volunteers experiencing technical difficulties</a:t>
+            </a:r>
+          </a:p>
+          <a:p>
+            <a:pPr marL="342900" marR="0" lvl="0" indent="-342900" fontAlgn="base">
               <a:spcBef>
                 <a:spcPts val="0"/>
               </a:spcBef>
               <a:spcAft>
                 <a:spcPts val="0"/>
               </a:spcAft>
+              <a:buSzPts val="1000"/>
               <a:buFont typeface="Symbol" pitchFamily="2" charset="2"/>
               <a:buChar char=""/>
+              <a:tabLst>
+                <a:tab pos="457200" algn="l"/>
+              </a:tabLst>
             </a:pPr>
             <a:endParaRPr lang="en-US" sz="2000" dirty="0">
+              <a:solidFill>
+                <a:srgbClr val="000000"/>
+              </a:solidFill>
               <a:effectLst/>
               <a:latin typeface="Source Sans Pro" panose="020B0503030403020204" pitchFamily="34" charset="0"/>
               <a:ea typeface="Source Sans Pro" panose="020B0503030403020204" pitchFamily="34" charset="0"/>
@@ -5204,15 +5269,19 @@
             </a:endParaRPr>
           </a:p>
           <a:p>
-            <a:pPr marL="342900" marR="0" lvl="0" indent="-342900">
+            <a:pPr marL="342900" marR="0" lvl="0" indent="-342900" fontAlgn="base">
               <a:spcBef>
                 <a:spcPts val="0"/>
               </a:spcBef>
               <a:spcAft>
                 <a:spcPts val="0"/>
               </a:spcAft>
+              <a:buSzPts val="1000"/>
               <a:buFont typeface="Symbol" pitchFamily="2" charset="2"/>
               <a:buChar char=""/>
+              <a:tabLst>
+                <a:tab pos="457200" algn="l"/>
+              </a:tabLst>
             </a:pPr>
             <a:r>
               <a:rPr lang="en-US" sz="2000" dirty="0">
@@ -5224,14 +5293,8 @@
                 <a:ea typeface="Source Sans Pro" panose="020B0503030403020204" pitchFamily="34" charset="0"/>
                 <a:cs typeface="Times New Roman" panose="02020603050405020304" pitchFamily="18" charset="0"/>
               </a:rPr>
-              <a:t>Engaged in weekly preparatory meetings to review content and assess teaching strategies</a:t>
-            </a:r>
-            <a:endParaRPr lang="en-US" sz="2000" dirty="0">
-              <a:effectLst/>
-              <a:latin typeface="Source Sans Pro" panose="020B0503030403020204" pitchFamily="34" charset="0"/>
-              <a:ea typeface="Source Sans Pro" panose="020B0503030403020204" pitchFamily="34" charset="0"/>
-              <a:cs typeface="Times New Roman" panose="02020603050405020304" pitchFamily="18" charset="0"/>
-            </a:endParaRPr>
+              <a:t>Recognized and quickly promoted multiple times to perform expanded cross-platform technical duties </a:t>
+            </a:r>
           </a:p>
         </p:txBody>
       </p:sp>
@@ -5249,7 +5312,7 @@
         </p:nvSpPr>
         <p:spPr>
           <a:xfrm>
-            <a:off x="804672" y="4181858"/>
+            <a:off x="804672" y="3956770"/>
             <a:ext cx="3612583" cy="646331"/>
           </a:xfrm>
           <a:prstGeom prst="rect">
@@ -5271,7 +5334,7 @@
                 <a:latin typeface="Source Sans Pro" panose="020B0503030403020204" pitchFamily="34" charset="0"/>
                 <a:ea typeface="Source Sans Pro" panose="020B0503030403020204" pitchFamily="34" charset="0"/>
               </a:rPr>
-              <a:t>Seattle Pacific University | Seattle, WA</a:t>
+              <a:t>Harley Rouda for Congress | Newport Beach, CA</a:t>
             </a:r>
           </a:p>
         </p:txBody>
@@ -5304,14 +5367,7 @@
           </a:bodyPr>
           <a:lstStyle/>
           <a:p>
-            <a:pPr marL="0" marR="0" algn="r">
-              <a:spcBef>
-                <a:spcPts val="0"/>
-              </a:spcBef>
-              <a:spcAft>
-                <a:spcPts val="0"/>
-              </a:spcAft>
-            </a:pPr>
+            <a:pPr algn="r"/>
             <a:r>
               <a:rPr lang="en-US" sz="2400" b="1" dirty="0">
                 <a:solidFill>
@@ -5320,9 +5376,8 @@
                 <a:effectLst/>
                 <a:latin typeface="Source Sans Pro" panose="020B0503030403020204" pitchFamily="34" charset="0"/>
                 <a:ea typeface="Source Sans Pro" panose="020B0503030403020204" pitchFamily="34" charset="0"/>
-                <a:cs typeface="Times New Roman" panose="02020603050405020304" pitchFamily="18" charset="0"/>
               </a:rPr>
-              <a:t>January </a:t>
+              <a:t> August </a:t>
             </a:r>
             <a:r>
               <a:rPr lang="en-US" sz="2400" dirty="0">
@@ -5332,7 +5387,6 @@
                 <a:effectLst/>
                 <a:latin typeface="Source Sans Pro" panose="020B0503030403020204" pitchFamily="34" charset="0"/>
                 <a:ea typeface="Source Sans Pro" panose="020B0503030403020204" pitchFamily="34" charset="0"/>
-                <a:cs typeface="Times New Roman" panose="02020603050405020304" pitchFamily="18" charset="0"/>
               </a:rPr>
               <a:t>–</a:t>
             </a:r>
@@ -5344,15 +5398,23 @@
                 <a:effectLst/>
                 <a:latin typeface="Source Sans Pro" panose="020B0503030403020204" pitchFamily="34" charset="0"/>
                 <a:ea typeface="Source Sans Pro" panose="020B0503030403020204" pitchFamily="34" charset="0"/>
-                <a:cs typeface="Times New Roman" panose="02020603050405020304" pitchFamily="18" charset="0"/>
               </a:rPr>
-              <a:t> March 2022</a:t>
-            </a:r>
-            <a:endParaRPr lang="en-US" sz="2400" dirty="0">
-              <a:effectLst/>
+              <a:t> November 2020</a:t>
+            </a:r>
+            <a:r>
+              <a:rPr lang="en-US" sz="2400" i="1" dirty="0">
+                <a:solidFill>
+                  <a:srgbClr val="000000"/>
+                </a:solidFill>
+                <a:effectLst/>
+                <a:latin typeface="Source Sans Pro" panose="020B0503030403020204" pitchFamily="34" charset="0"/>
+                <a:ea typeface="Source Sans Pro" panose="020B0503030403020204" pitchFamily="34" charset="0"/>
+              </a:rPr>
+              <a:t> </a:t>
+            </a:r>
+            <a:endParaRPr lang="en-US" sz="2400" b="1" dirty="0">
               <a:latin typeface="Source Sans Pro" panose="020B0503030403020204" pitchFamily="34" charset="0"/>
               <a:ea typeface="Source Sans Pro" panose="020B0503030403020204" pitchFamily="34" charset="0"/>
-              <a:cs typeface="Times New Roman" panose="02020603050405020304" pitchFamily="18" charset="0"/>
             </a:endParaRPr>
           </a:p>
         </p:txBody>
@@ -5360,7 +5422,7 @@
     </p:spTree>
     <p:extLst>
       <p:ext uri="{BB962C8B-B14F-4D97-AF65-F5344CB8AC3E}">
-        <p14:creationId xmlns:p14="http://schemas.microsoft.com/office/powerpoint/2010/main" val="197187033"/>
+        <p14:creationId xmlns:p14="http://schemas.microsoft.com/office/powerpoint/2010/main" val="811670889"/>
       </p:ext>
     </p:extLst>
   </p:cSld>
@@ -5753,7 +5815,7 @@
                 <a:latin typeface="Source Sans Pro" panose="020B0503030403020204" pitchFamily="34" charset="0"/>
                 <a:ea typeface="Source Sans Pro" panose="020B0503030403020204" pitchFamily="34" charset="0"/>
               </a:rPr>
-              <a:t>Physics Tutor</a:t>
+              <a:t>Physics Learning Assistant</a:t>
             </a:r>
           </a:p>
         </p:txBody>
@@ -5786,19 +5848,15 @@
           </a:bodyPr>
           <a:lstStyle/>
           <a:p>
-            <a:pPr marL="342900" marR="0" lvl="0" indent="-342900" fontAlgn="base">
+            <a:pPr marL="342900" marR="0" lvl="0" indent="-342900">
               <a:spcBef>
                 <a:spcPts val="0"/>
               </a:spcBef>
               <a:spcAft>
                 <a:spcPts val="0"/>
               </a:spcAft>
-              <a:buSzPts val="1000"/>
               <a:buFont typeface="Symbol" pitchFamily="2" charset="2"/>
               <a:buChar char=""/>
-              <a:tabLst>
-                <a:tab pos="457200" algn="l"/>
-              </a:tabLst>
             </a:pPr>
             <a:r>
               <a:rPr lang="en-US" sz="2000" dirty="0">
@@ -5810,28 +5868,21 @@
                 <a:ea typeface="Source Sans Pro" panose="020B0503030403020204" pitchFamily="34" charset="0"/>
                 <a:cs typeface="Times New Roman" panose="02020603050405020304" pitchFamily="18" charset="0"/>
               </a:rPr>
-              <a:t>Recommended by former teacher to current students on account of subject prowess and knowledge</a:t>
-            </a:r>
-          </a:p>
-          <a:p>
-            <a:pPr marL="342900" marR="0" lvl="0" indent="-342900" fontAlgn="base">
+              <a:t>Assisted peer students in physics learning, experimenting, and assignments </a:t>
+            </a:r>
+          </a:p>
+          <a:p>
+            <a:pPr marL="342900" marR="0" lvl="0" indent="-342900">
               <a:spcBef>
                 <a:spcPts val="0"/>
               </a:spcBef>
               <a:spcAft>
                 <a:spcPts val="0"/>
               </a:spcAft>
-              <a:buSzPts val="1000"/>
               <a:buFont typeface="Symbol" pitchFamily="2" charset="2"/>
               <a:buChar char=""/>
-              <a:tabLst>
-                <a:tab pos="457200" algn="l"/>
-              </a:tabLst>
             </a:pPr>
             <a:endParaRPr lang="en-US" sz="2000" dirty="0">
-              <a:solidFill>
-                <a:srgbClr val="000000"/>
-              </a:solidFill>
               <a:effectLst/>
               <a:latin typeface="Source Sans Pro" panose="020B0503030403020204" pitchFamily="34" charset="0"/>
               <a:ea typeface="Source Sans Pro" panose="020B0503030403020204" pitchFamily="34" charset="0"/>
@@ -5839,19 +5890,15 @@
             </a:endParaRPr>
           </a:p>
           <a:p>
-            <a:pPr marL="342900" marR="0" lvl="0" indent="-342900" fontAlgn="base">
+            <a:pPr marL="342900" marR="0" lvl="0" indent="-342900">
               <a:spcBef>
                 <a:spcPts val="0"/>
               </a:spcBef>
               <a:spcAft>
                 <a:spcPts val="0"/>
               </a:spcAft>
-              <a:buSzPts val="1000"/>
               <a:buFont typeface="Symbol" pitchFamily="2" charset="2"/>
               <a:buChar char=""/>
-              <a:tabLst>
-                <a:tab pos="457200" algn="l"/>
-              </a:tabLst>
             </a:pPr>
             <a:r>
               <a:rPr lang="en-US" sz="2000" dirty="0">
@@ -5863,28 +5910,21 @@
                 <a:ea typeface="Source Sans Pro" panose="020B0503030403020204" pitchFamily="34" charset="0"/>
                 <a:cs typeface="Times New Roman" panose="02020603050405020304" pitchFamily="18" charset="0"/>
               </a:rPr>
-              <a:t>Consulted with parents and students to establish specific learning goals and create optimal experience</a:t>
-            </a:r>
-          </a:p>
-          <a:p>
-            <a:pPr marL="342900" marR="0" lvl="0" indent="-342900" fontAlgn="base">
+              <a:t>Undertook concurrent coursework in teaching pedagogy to dynamically improve</a:t>
+            </a:r>
+          </a:p>
+          <a:p>
+            <a:pPr marL="342900" marR="0" lvl="0" indent="-342900">
               <a:spcBef>
                 <a:spcPts val="0"/>
               </a:spcBef>
               <a:spcAft>
                 <a:spcPts val="0"/>
               </a:spcAft>
-              <a:buSzPts val="1000"/>
               <a:buFont typeface="Symbol" pitchFamily="2" charset="2"/>
               <a:buChar char=""/>
-              <a:tabLst>
-                <a:tab pos="457200" algn="l"/>
-              </a:tabLst>
             </a:pPr>
             <a:endParaRPr lang="en-US" sz="2000" dirty="0">
-              <a:solidFill>
-                <a:srgbClr val="000000"/>
-              </a:solidFill>
               <a:effectLst/>
               <a:latin typeface="Source Sans Pro" panose="020B0503030403020204" pitchFamily="34" charset="0"/>
               <a:ea typeface="Source Sans Pro" panose="020B0503030403020204" pitchFamily="34" charset="0"/>
@@ -5892,19 +5932,15 @@
             </a:endParaRPr>
           </a:p>
           <a:p>
-            <a:pPr marL="342900" marR="0" lvl="0" indent="-342900" fontAlgn="base">
+            <a:pPr marL="342900" marR="0" lvl="0" indent="-342900">
               <a:spcBef>
                 <a:spcPts val="0"/>
               </a:spcBef>
               <a:spcAft>
                 <a:spcPts val="0"/>
               </a:spcAft>
-              <a:buSzPts val="1000"/>
               <a:buFont typeface="Symbol" pitchFamily="2" charset="2"/>
               <a:buChar char=""/>
-              <a:tabLst>
-                <a:tab pos="457200" algn="l"/>
-              </a:tabLst>
             </a:pPr>
             <a:r>
               <a:rPr lang="en-US" sz="2000" dirty="0">
@@ -5916,62 +5952,15 @@
                 <a:ea typeface="Source Sans Pro" panose="020B0503030403020204" pitchFamily="34" charset="0"/>
                 <a:cs typeface="Times New Roman" panose="02020603050405020304" pitchFamily="18" charset="0"/>
               </a:rPr>
-              <a:t>Adapted to different learning styles and needs to dynamically prepare for examinations and increase subject retention</a:t>
-            </a:r>
-          </a:p>
-          <a:p>
-            <a:pPr marL="342900" marR="0" lvl="0" indent="-342900" fontAlgn="base">
-              <a:spcBef>
-                <a:spcPts val="0"/>
-              </a:spcBef>
-              <a:spcAft>
-                <a:spcPts val="0"/>
-              </a:spcAft>
-              <a:buSzPts val="1000"/>
-              <a:buFont typeface="Symbol" pitchFamily="2" charset="2"/>
-              <a:buChar char=""/>
-              <a:tabLst>
-                <a:tab pos="457200" algn="l"/>
-              </a:tabLst>
-            </a:pPr>
+              <a:t>Engaged in weekly preparatory meetings to review content and assess teaching strategies</a:t>
+            </a:r>
             <a:endParaRPr lang="en-US" sz="2000" dirty="0">
-              <a:solidFill>
-                <a:srgbClr val="000000"/>
-              </a:solidFill>
               <a:effectLst/>
               <a:latin typeface="Source Sans Pro" panose="020B0503030403020204" pitchFamily="34" charset="0"/>
               <a:ea typeface="Source Sans Pro" panose="020B0503030403020204" pitchFamily="34" charset="0"/>
               <a:cs typeface="Times New Roman" panose="02020603050405020304" pitchFamily="18" charset="0"/>
             </a:endParaRPr>
           </a:p>
-          <a:p>
-            <a:pPr marL="342900" marR="0" lvl="0" indent="-342900" fontAlgn="base">
-              <a:spcBef>
-                <a:spcPts val="0"/>
-              </a:spcBef>
-              <a:spcAft>
-                <a:spcPts val="0"/>
-              </a:spcAft>
-              <a:buSzPts val="1000"/>
-              <a:buFont typeface="Symbol" pitchFamily="2" charset="2"/>
-              <a:buChar char=""/>
-              <a:tabLst>
-                <a:tab pos="457200" algn="l"/>
-              </a:tabLst>
-            </a:pPr>
-            <a:r>
-              <a:rPr lang="en-US" sz="2000" dirty="0">
-                <a:solidFill>
-                  <a:srgbClr val="000000"/>
-                </a:solidFill>
-                <a:effectLst/>
-                <a:latin typeface="Source Sans Pro" panose="020B0503030403020204" pitchFamily="34" charset="0"/>
-                <a:ea typeface="Source Sans Pro" panose="020B0503030403020204" pitchFamily="34" charset="0"/>
-                <a:cs typeface="Times New Roman" panose="02020603050405020304" pitchFamily="18" charset="0"/>
-              </a:rPr>
-              <a:t>Methods yielded marked improvements including average test scores increasing by 2 letter grades</a:t>
-            </a:r>
-          </a:p>
         </p:txBody>
       </p:sp>
       <p:sp>
@@ -5988,7 +5977,7 @@
         </p:nvSpPr>
         <p:spPr>
           <a:xfrm>
-            <a:off x="804672" y="3886438"/>
+            <a:off x="804672" y="4181858"/>
             <a:ext cx="3612583" cy="646331"/>
           </a:xfrm>
           <a:prstGeom prst="rect">
@@ -6010,7 +5999,7 @@
                 <a:latin typeface="Source Sans Pro" panose="020B0503030403020204" pitchFamily="34" charset="0"/>
                 <a:ea typeface="Source Sans Pro" panose="020B0503030403020204" pitchFamily="34" charset="0"/>
               </a:rPr>
-              <a:t>Freelance | Newport Beach, CA / Seattle, WA</a:t>
+              <a:t>Seattle Pacific University | Seattle, WA</a:t>
             </a:r>
           </a:p>
         </p:txBody>
@@ -6043,7 +6032,14 @@
           </a:bodyPr>
           <a:lstStyle/>
           <a:p>
-            <a:pPr algn="r"/>
+            <a:pPr marL="0" marR="0" algn="r">
+              <a:spcBef>
+                <a:spcPts val="0"/>
+              </a:spcBef>
+              <a:spcAft>
+                <a:spcPts val="0"/>
+              </a:spcAft>
+            </a:pPr>
             <a:r>
               <a:rPr lang="en-US" sz="2400" b="1" dirty="0">
                 <a:solidFill>
@@ -6052,8 +6048,9 @@
                 <a:effectLst/>
                 <a:latin typeface="Source Sans Pro" panose="020B0503030403020204" pitchFamily="34" charset="0"/>
                 <a:ea typeface="Source Sans Pro" panose="020B0503030403020204" pitchFamily="34" charset="0"/>
+                <a:cs typeface="Times New Roman" panose="02020603050405020304" pitchFamily="18" charset="0"/>
               </a:rPr>
-              <a:t>February 2021 </a:t>
+              <a:t>January </a:t>
             </a:r>
             <a:r>
               <a:rPr lang="en-US" sz="2400" dirty="0">
@@ -6063,6 +6060,7 @@
                 <a:effectLst/>
                 <a:latin typeface="Source Sans Pro" panose="020B0503030403020204" pitchFamily="34" charset="0"/>
                 <a:ea typeface="Source Sans Pro" panose="020B0503030403020204" pitchFamily="34" charset="0"/>
+                <a:cs typeface="Times New Roman" panose="02020603050405020304" pitchFamily="18" charset="0"/>
               </a:rPr>
               <a:t>–</a:t>
             </a:r>
@@ -6074,20 +6072,15 @@
                 <a:effectLst/>
                 <a:latin typeface="Source Sans Pro" panose="020B0503030403020204" pitchFamily="34" charset="0"/>
                 <a:ea typeface="Source Sans Pro" panose="020B0503030403020204" pitchFamily="34" charset="0"/>
+                <a:cs typeface="Times New Roman" panose="02020603050405020304" pitchFamily="18" charset="0"/>
               </a:rPr>
-              <a:t> Present</a:t>
-            </a:r>
-            <a:r>
-              <a:rPr lang="en-US" sz="2400" dirty="0">
-                <a:effectLst/>
-                <a:latin typeface="Source Sans Pro" panose="020B0503030403020204" pitchFamily="34" charset="0"/>
-                <a:ea typeface="Source Sans Pro" panose="020B0503030403020204" pitchFamily="34" charset="0"/>
-              </a:rPr>
-              <a:t> </a:t>
-            </a:r>
-            <a:endParaRPr lang="en-US" sz="2400" b="1" dirty="0">
+              <a:t> March 2022</a:t>
+            </a:r>
+            <a:endParaRPr lang="en-US" sz="2400" dirty="0">
+              <a:effectLst/>
               <a:latin typeface="Source Sans Pro" panose="020B0503030403020204" pitchFamily="34" charset="0"/>
               <a:ea typeface="Source Sans Pro" panose="020B0503030403020204" pitchFamily="34" charset="0"/>
+              <a:cs typeface="Times New Roman" panose="02020603050405020304" pitchFamily="18" charset="0"/>
             </a:endParaRPr>
           </a:p>
         </p:txBody>
@@ -6095,7 +6088,7 @@
     </p:spTree>
     <p:extLst>
       <p:ext uri="{BB962C8B-B14F-4D97-AF65-F5344CB8AC3E}">
-        <p14:creationId xmlns:p14="http://schemas.microsoft.com/office/powerpoint/2010/main" val="1480142465"/>
+        <p14:creationId xmlns:p14="http://schemas.microsoft.com/office/powerpoint/2010/main" val="197187033"/>
       </p:ext>
     </p:extLst>
   </p:cSld>
@@ -6488,7 +6481,7 @@
                 <a:latin typeface="Source Sans Pro" panose="020B0503030403020204" pitchFamily="34" charset="0"/>
                 <a:ea typeface="Source Sans Pro" panose="020B0503030403020204" pitchFamily="34" charset="0"/>
               </a:rPr>
-              <a:t>Football Referee</a:t>
+              <a:t>Physics Tutor</a:t>
             </a:r>
           </a:p>
         </p:txBody>
@@ -6545,7 +6538,7 @@
                 <a:ea typeface="Source Sans Pro" panose="020B0503030403020204" pitchFamily="34" charset="0"/>
                 <a:cs typeface="Times New Roman" panose="02020603050405020304" pitchFamily="18" charset="0"/>
               </a:rPr>
-              <a:t>Extensive training and execution of conflict management strategies across a variety of situations</a:t>
+              <a:t>Recommended by former teacher to current students on account of subject prowess and knowledge</a:t>
             </a:r>
           </a:p>
           <a:p>
@@ -6598,7 +6591,7 @@
                 <a:ea typeface="Source Sans Pro" panose="020B0503030403020204" pitchFamily="34" charset="0"/>
                 <a:cs typeface="Times New Roman" panose="02020603050405020304" pitchFamily="18" charset="0"/>
               </a:rPr>
-              <a:t>High performance in a fast-paced, high-pressure work environment</a:t>
+              <a:t>Consulted with parents and students to establish specific learning goals and create optimal experience</a:t>
             </a:r>
           </a:p>
           <a:p>
@@ -6651,7 +6644,7 @@
                 <a:ea typeface="Source Sans Pro" panose="020B0503030403020204" pitchFamily="34" charset="0"/>
                 <a:cs typeface="Times New Roman" panose="02020603050405020304" pitchFamily="18" charset="0"/>
               </a:rPr>
-              <a:t>Demonstrated ability to recognize and react to complex situations in real time</a:t>
+              <a:t>Adapted to different learning styles and needs to dynamically prepare for examinations and increase subject retention</a:t>
             </a:r>
           </a:p>
           <a:p>
@@ -6704,7 +6697,7 @@
                 <a:ea typeface="Source Sans Pro" panose="020B0503030403020204" pitchFamily="34" charset="0"/>
                 <a:cs typeface="Times New Roman" panose="02020603050405020304" pitchFamily="18" charset="0"/>
               </a:rPr>
-              <a:t>Multi-faceted skillset and teaching ability led to multiple promotions including officiating additional sports</a:t>
+              <a:t>Methods yielded marked improvements including average test scores increasing by 2 letter grades</a:t>
             </a:r>
           </a:p>
         </p:txBody>
@@ -6723,7 +6716,7 @@
         </p:nvSpPr>
         <p:spPr>
           <a:xfrm>
-            <a:off x="804672" y="3900506"/>
+            <a:off x="804672" y="3886438"/>
             <a:ext cx="3612583" cy="646331"/>
           </a:xfrm>
           <a:prstGeom prst="rect">
@@ -6745,7 +6738,7 @@
                 <a:latin typeface="Source Sans Pro" panose="020B0503030403020204" pitchFamily="34" charset="0"/>
                 <a:ea typeface="Source Sans Pro" panose="020B0503030403020204" pitchFamily="34" charset="0"/>
               </a:rPr>
-              <a:t>Underdog Sports Leagues | Seattle, WA</a:t>
+              <a:t>Freelance | Newport Beach, CA / Seattle, WA</a:t>
             </a:r>
           </a:p>
         </p:txBody>
@@ -6778,14 +6771,7 @@
           </a:bodyPr>
           <a:lstStyle/>
           <a:p>
-            <a:pPr marL="0" marR="0" algn="r">
-              <a:spcBef>
-                <a:spcPts val="0"/>
-              </a:spcBef>
-              <a:spcAft>
-                <a:spcPts val="0"/>
-              </a:spcAft>
-            </a:pPr>
+            <a:pPr algn="r"/>
             <a:r>
               <a:rPr lang="en-US" sz="2400" b="1" dirty="0">
                 <a:solidFill>
@@ -6794,9 +6780,8 @@
                 <a:effectLst/>
                 <a:latin typeface="Source Sans Pro" panose="020B0503030403020204" pitchFamily="34" charset="0"/>
                 <a:ea typeface="Source Sans Pro" panose="020B0503030403020204" pitchFamily="34" charset="0"/>
-                <a:cs typeface="Times New Roman" panose="02020603050405020304" pitchFamily="18" charset="0"/>
               </a:rPr>
-              <a:t>September 2019 </a:t>
+              <a:t>February 2021 </a:t>
             </a:r>
             <a:r>
               <a:rPr lang="en-US" sz="2400" dirty="0">
@@ -6806,7 +6791,6 @@
                 <a:effectLst/>
                 <a:latin typeface="Source Sans Pro" panose="020B0503030403020204" pitchFamily="34" charset="0"/>
                 <a:ea typeface="Source Sans Pro" panose="020B0503030403020204" pitchFamily="34" charset="0"/>
-                <a:cs typeface="Times New Roman" panose="02020603050405020304" pitchFamily="18" charset="0"/>
               </a:rPr>
               <a:t>–</a:t>
             </a:r>
@@ -6818,15 +6802,20 @@
                 <a:effectLst/>
                 <a:latin typeface="Source Sans Pro" panose="020B0503030403020204" pitchFamily="34" charset="0"/>
                 <a:ea typeface="Source Sans Pro" panose="020B0503030403020204" pitchFamily="34" charset="0"/>
-                <a:cs typeface="Times New Roman" panose="02020603050405020304" pitchFamily="18" charset="0"/>
               </a:rPr>
               <a:t> Present</a:t>
             </a:r>
-            <a:endParaRPr lang="en-US" sz="2400" dirty="0">
-              <a:effectLst/>
+            <a:r>
+              <a:rPr lang="en-US" sz="2400" dirty="0">
+                <a:effectLst/>
+                <a:latin typeface="Source Sans Pro" panose="020B0503030403020204" pitchFamily="34" charset="0"/>
+                <a:ea typeface="Source Sans Pro" panose="020B0503030403020204" pitchFamily="34" charset="0"/>
+              </a:rPr>
+              <a:t> </a:t>
+            </a:r>
+            <a:endParaRPr lang="en-US" sz="2400" b="1" dirty="0">
               <a:latin typeface="Source Sans Pro" panose="020B0503030403020204" pitchFamily="34" charset="0"/>
               <a:ea typeface="Source Sans Pro" panose="020B0503030403020204" pitchFamily="34" charset="0"/>
-              <a:cs typeface="Times New Roman" panose="02020603050405020304" pitchFamily="18" charset="0"/>
             </a:endParaRPr>
           </a:p>
         </p:txBody>
@@ -6834,7 +6823,7 @@
     </p:spTree>
     <p:extLst>
       <p:ext uri="{BB962C8B-B14F-4D97-AF65-F5344CB8AC3E}">
-        <p14:creationId xmlns:p14="http://schemas.microsoft.com/office/powerpoint/2010/main" val="1684223652"/>
+        <p14:creationId xmlns:p14="http://schemas.microsoft.com/office/powerpoint/2010/main" val="1480142465"/>
       </p:ext>
     </p:extLst>
   </p:cSld>
@@ -7227,7 +7216,7 @@
                 <a:latin typeface="Source Sans Pro" panose="020B0503030403020204" pitchFamily="34" charset="0"/>
                 <a:ea typeface="Source Sans Pro" panose="020B0503030403020204" pitchFamily="34" charset="0"/>
               </a:rPr>
-              <a:t>Eagle Scout</a:t>
+              <a:t>Football Referee</a:t>
             </a:r>
           </a:p>
         </p:txBody>
@@ -7284,122 +7273,7 @@
                 <a:ea typeface="Source Sans Pro" panose="020B0503030403020204" pitchFamily="34" charset="0"/>
                 <a:cs typeface="Times New Roman" panose="02020603050405020304" pitchFamily="18" charset="0"/>
               </a:rPr>
-              <a:t>Fulfillment of all BSA requirements</a:t>
-            </a:r>
-          </a:p>
-          <a:p>
-            <a:pPr marL="342900" marR="0" lvl="0" indent="-342900" fontAlgn="base">
-              <a:spcBef>
-                <a:spcPts val="0"/>
-              </a:spcBef>
-              <a:spcAft>
-                <a:spcPts val="0"/>
-              </a:spcAft>
-              <a:buSzPts val="1000"/>
-              <a:buFont typeface="Symbol" pitchFamily="2" charset="2"/>
-              <a:buChar char=""/>
-              <a:tabLst>
-                <a:tab pos="457200" algn="l"/>
-              </a:tabLst>
-            </a:pPr>
-            <a:endParaRPr lang="en-US" sz="2000" dirty="0">
-              <a:solidFill>
-                <a:srgbClr val="000000"/>
-              </a:solidFill>
-              <a:latin typeface="Source Sans Pro" panose="020B0503030403020204" pitchFamily="34" charset="0"/>
-              <a:ea typeface="Source Sans Pro" panose="020B0503030403020204" pitchFamily="34" charset="0"/>
-              <a:cs typeface="Times New Roman" panose="02020603050405020304" pitchFamily="18" charset="0"/>
-            </a:endParaRPr>
-          </a:p>
-          <a:p>
-            <a:pPr marL="342900" marR="0" lvl="0" indent="-342900" fontAlgn="base">
-              <a:spcBef>
-                <a:spcPts val="0"/>
-              </a:spcBef>
-              <a:spcAft>
-                <a:spcPts val="0"/>
-              </a:spcAft>
-              <a:buSzPts val="1000"/>
-              <a:buFont typeface="Symbol" pitchFamily="2" charset="2"/>
-              <a:buChar char=""/>
-              <a:tabLst>
-                <a:tab pos="457200" algn="l"/>
-              </a:tabLst>
-            </a:pPr>
-            <a:r>
-              <a:rPr lang="en-US" sz="2000" dirty="0">
-                <a:solidFill>
-                  <a:srgbClr val="000000"/>
-                </a:solidFill>
-                <a:effectLst/>
-                <a:latin typeface="Source Sans Pro" panose="020B0503030403020204" pitchFamily="34" charset="0"/>
-                <a:ea typeface="Source Sans Pro" panose="020B0503030403020204" pitchFamily="34" charset="0"/>
-                <a:cs typeface="Times New Roman" panose="02020603050405020304" pitchFamily="18" charset="0"/>
-              </a:rPr>
-              <a:t>24 merit badges</a:t>
-            </a:r>
-          </a:p>
-          <a:p>
-            <a:pPr marL="342900" marR="0" lvl="0" indent="-342900" fontAlgn="base">
-              <a:spcBef>
-                <a:spcPts val="0"/>
-              </a:spcBef>
-              <a:spcAft>
-                <a:spcPts val="0"/>
-              </a:spcAft>
-              <a:buSzPts val="1000"/>
-              <a:buFont typeface="Symbol" pitchFamily="2" charset="2"/>
-              <a:buChar char=""/>
-              <a:tabLst>
-                <a:tab pos="457200" algn="l"/>
-              </a:tabLst>
-            </a:pPr>
-            <a:endParaRPr lang="en-US" sz="2000" dirty="0">
-              <a:solidFill>
-                <a:srgbClr val="000000"/>
-              </a:solidFill>
-              <a:latin typeface="Source Sans Pro" panose="020B0503030403020204" pitchFamily="34" charset="0"/>
-              <a:ea typeface="Source Sans Pro" panose="020B0503030403020204" pitchFamily="34" charset="0"/>
-              <a:cs typeface="Times New Roman" panose="02020603050405020304" pitchFamily="18" charset="0"/>
-            </a:endParaRPr>
-          </a:p>
-          <a:p>
-            <a:pPr marL="342900" marR="0" lvl="0" indent="-342900" fontAlgn="base">
-              <a:spcBef>
-                <a:spcPts val="0"/>
-              </a:spcBef>
-              <a:spcAft>
-                <a:spcPts val="0"/>
-              </a:spcAft>
-              <a:buSzPts val="1000"/>
-              <a:buFont typeface="Symbol" pitchFamily="2" charset="2"/>
-              <a:buChar char=""/>
-              <a:tabLst>
-                <a:tab pos="457200" algn="l"/>
-              </a:tabLst>
-            </a:pPr>
-            <a:r>
-              <a:rPr lang="en-US" sz="2000" dirty="0">
-                <a:solidFill>
-                  <a:srgbClr val="000000"/>
-                </a:solidFill>
-                <a:latin typeface="Source Sans Pro" panose="020B0503030403020204" pitchFamily="34" charset="0"/>
-                <a:ea typeface="Source Sans Pro" panose="020B0503030403020204" pitchFamily="34" charset="0"/>
-                <a:cs typeface="Times New Roman" panose="02020603050405020304" pitchFamily="18" charset="0"/>
-              </a:rPr>
-              <a:t>O</a:t>
-            </a:r>
-            <a:r>
-              <a:rPr lang="en-US" sz="2000" dirty="0">
-                <a:solidFill>
-                  <a:srgbClr val="000000"/>
-                </a:solidFill>
-                <a:effectLst/>
-                <a:latin typeface="Source Sans Pro" panose="020B0503030403020204" pitchFamily="34" charset="0"/>
-                <a:ea typeface="Source Sans Pro" panose="020B0503030403020204" pitchFamily="34" charset="0"/>
-                <a:cs typeface="Times New Roman" panose="02020603050405020304" pitchFamily="18" charset="0"/>
-              </a:rPr>
-              <a:t>ver 3 years of leadership experience at both small scale (leading a unit of 7-10 boys) and large scale (managing a troop of 60+ boys and 20+ adults)</a:t>
+              <a:t>Extensive training and execution of conflict management strategies across a variety of situations</a:t>
             </a:r>
           </a:p>
           <a:p>
@@ -7450,24 +7324,117 @@
                 <a:effectLst/>
                 <a:latin typeface="Source Sans Pro" panose="020B0503030403020204" pitchFamily="34" charset="0"/>
                 <a:ea typeface="Source Sans Pro" panose="020B0503030403020204" pitchFamily="34" charset="0"/>
+                <a:cs typeface="Times New Roman" panose="02020603050405020304" pitchFamily="18" charset="0"/>
               </a:rPr>
-              <a:t>Innovated, coordinated, led, and executed 100+ hour project to help local Alzheimer’s patients</a:t>
-            </a:r>
-            <a:r>
-              <a:rPr lang="en-US" sz="2000" dirty="0">
-                <a:effectLst/>
-                <a:latin typeface="Source Sans Pro" panose="020B0503030403020204" pitchFamily="34" charset="0"/>
-                <a:ea typeface="Source Sans Pro" panose="020B0503030403020204" pitchFamily="34" charset="0"/>
-              </a:rPr>
-              <a:t> </a:t>
-            </a:r>
+              <a:t>High performance in a fast-paced, high-pressure work environment</a:t>
+            </a:r>
+          </a:p>
+          <a:p>
+            <a:pPr marL="342900" marR="0" lvl="0" indent="-342900" fontAlgn="base">
+              <a:spcBef>
+                <a:spcPts val="0"/>
+              </a:spcBef>
+              <a:spcAft>
+                <a:spcPts val="0"/>
+              </a:spcAft>
+              <a:buSzPts val="1000"/>
+              <a:buFont typeface="Symbol" pitchFamily="2" charset="2"/>
+              <a:buChar char=""/>
+              <a:tabLst>
+                <a:tab pos="457200" algn="l"/>
+              </a:tabLst>
+            </a:pPr>
             <a:endParaRPr lang="en-US" sz="2000" dirty="0">
+              <a:solidFill>
+                <a:srgbClr val="000000"/>
+              </a:solidFill>
               <a:effectLst/>
               <a:latin typeface="Source Sans Pro" panose="020B0503030403020204" pitchFamily="34" charset="0"/>
               <a:ea typeface="Source Sans Pro" panose="020B0503030403020204" pitchFamily="34" charset="0"/>
               <a:cs typeface="Times New Roman" panose="02020603050405020304" pitchFamily="18" charset="0"/>
             </a:endParaRPr>
           </a:p>
+          <a:p>
+            <a:pPr marL="342900" marR="0" lvl="0" indent="-342900" fontAlgn="base">
+              <a:spcBef>
+                <a:spcPts val="0"/>
+              </a:spcBef>
+              <a:spcAft>
+                <a:spcPts val="0"/>
+              </a:spcAft>
+              <a:buSzPts val="1000"/>
+              <a:buFont typeface="Symbol" pitchFamily="2" charset="2"/>
+              <a:buChar char=""/>
+              <a:tabLst>
+                <a:tab pos="457200" algn="l"/>
+              </a:tabLst>
+            </a:pPr>
+            <a:r>
+              <a:rPr lang="en-US" sz="2000" dirty="0">
+                <a:solidFill>
+                  <a:srgbClr val="000000"/>
+                </a:solidFill>
+                <a:effectLst/>
+                <a:latin typeface="Source Sans Pro" panose="020B0503030403020204" pitchFamily="34" charset="0"/>
+                <a:ea typeface="Source Sans Pro" panose="020B0503030403020204" pitchFamily="34" charset="0"/>
+                <a:cs typeface="Times New Roman" panose="02020603050405020304" pitchFamily="18" charset="0"/>
+              </a:rPr>
+              <a:t>Demonstrated ability to recognize and react to complex situations in real time</a:t>
+            </a:r>
+          </a:p>
+          <a:p>
+            <a:pPr marL="342900" marR="0" lvl="0" indent="-342900" fontAlgn="base">
+              <a:spcBef>
+                <a:spcPts val="0"/>
+              </a:spcBef>
+              <a:spcAft>
+                <a:spcPts val="0"/>
+              </a:spcAft>
+              <a:buSzPts val="1000"/>
+              <a:buFont typeface="Symbol" pitchFamily="2" charset="2"/>
+              <a:buChar char=""/>
+              <a:tabLst>
+                <a:tab pos="457200" algn="l"/>
+              </a:tabLst>
+            </a:pPr>
+            <a:endParaRPr lang="en-US" sz="2000" dirty="0">
+              <a:solidFill>
+                <a:srgbClr val="000000"/>
+              </a:solidFill>
+              <a:effectLst/>
+              <a:latin typeface="Source Sans Pro" panose="020B0503030403020204" pitchFamily="34" charset="0"/>
+              <a:ea typeface="Source Sans Pro" panose="020B0503030403020204" pitchFamily="34" charset="0"/>
+              <a:cs typeface="Times New Roman" panose="02020603050405020304" pitchFamily="18" charset="0"/>
+            </a:endParaRPr>
+          </a:p>
+          <a:p>
+            <a:pPr marL="342900" marR="0" lvl="0" indent="-342900" fontAlgn="base">
+              <a:spcBef>
+                <a:spcPts val="0"/>
+              </a:spcBef>
+              <a:spcAft>
+                <a:spcPts val="0"/>
+              </a:spcAft>
+              <a:buSzPts val="1000"/>
+              <a:buFont typeface="Symbol" pitchFamily="2" charset="2"/>
+              <a:buChar char=""/>
+              <a:tabLst>
+                <a:tab pos="457200" algn="l"/>
+              </a:tabLst>
+            </a:pPr>
+            <a:r>
+              <a:rPr lang="en-US" sz="2000" dirty="0">
+                <a:solidFill>
+                  <a:srgbClr val="000000"/>
+                </a:solidFill>
+                <a:effectLst/>
+                <a:latin typeface="Source Sans Pro" panose="020B0503030403020204" pitchFamily="34" charset="0"/>
+                <a:ea typeface="Source Sans Pro" panose="020B0503030403020204" pitchFamily="34" charset="0"/>
+                <a:cs typeface="Times New Roman" panose="02020603050405020304" pitchFamily="18" charset="0"/>
+              </a:rPr>
+              <a:t>Multi-faceted skillset and teaching ability led to multiple promotions including officiating additional sports</a:t>
+            </a:r>
+          </a:p>
         </p:txBody>
       </p:sp>
       <p:sp>
@@ -7484,8 +7451,8 @@
         </p:nvSpPr>
         <p:spPr>
           <a:xfrm>
-            <a:off x="804672" y="3633221"/>
-            <a:ext cx="3612583" cy="369332"/>
+            <a:off x="804672" y="3900506"/>
+            <a:ext cx="3612583" cy="646331"/>
           </a:xfrm>
           <a:prstGeom prst="rect">
             <a:avLst/>
@@ -7506,7 +7473,7 @@
                 <a:latin typeface="Source Sans Pro" panose="020B0503030403020204" pitchFamily="34" charset="0"/>
                 <a:ea typeface="Source Sans Pro" panose="020B0503030403020204" pitchFamily="34" charset="0"/>
               </a:rPr>
-              <a:t>BSA Troop 1 | Huntington Beach, CA</a:t>
+              <a:t>Underdog Sports Leagues | Seattle, WA</a:t>
             </a:r>
           </a:p>
         </p:txBody>
@@ -7557,7 +7524,31 @@
                 <a:ea typeface="Source Sans Pro" panose="020B0503030403020204" pitchFamily="34" charset="0"/>
                 <a:cs typeface="Times New Roman" panose="02020603050405020304" pitchFamily="18" charset="0"/>
               </a:rPr>
-              <a:t>Awarded September 2019</a:t>
+              <a:t>September 2019 </a:t>
+            </a:r>
+            <a:r>
+              <a:rPr lang="en-US" sz="2400" dirty="0">
+                <a:solidFill>
+                  <a:srgbClr val="000000"/>
+                </a:solidFill>
+                <a:effectLst/>
+                <a:latin typeface="Source Sans Pro" panose="020B0503030403020204" pitchFamily="34" charset="0"/>
+                <a:ea typeface="Source Sans Pro" panose="020B0503030403020204" pitchFamily="34" charset="0"/>
+                <a:cs typeface="Times New Roman" panose="02020603050405020304" pitchFamily="18" charset="0"/>
+              </a:rPr>
+              <a:t>–</a:t>
+            </a:r>
+            <a:r>
+              <a:rPr lang="en-US" sz="2400" b="1" dirty="0">
+                <a:solidFill>
+                  <a:srgbClr val="000000"/>
+                </a:solidFill>
+                <a:effectLst/>
+                <a:latin typeface="Source Sans Pro" panose="020B0503030403020204" pitchFamily="34" charset="0"/>
+                <a:ea typeface="Source Sans Pro" panose="020B0503030403020204" pitchFamily="34" charset="0"/>
+                <a:cs typeface="Times New Roman" panose="02020603050405020304" pitchFamily="18" charset="0"/>
+              </a:rPr>
+              <a:t> Present</a:t>
             </a:r>
             <a:endParaRPr lang="en-US" sz="2400" dirty="0">
               <a:effectLst/>
@@ -7571,7 +7562,7 @@
     </p:spTree>
     <p:extLst>
       <p:ext uri="{BB962C8B-B14F-4D97-AF65-F5344CB8AC3E}">
-        <p14:creationId xmlns:p14="http://schemas.microsoft.com/office/powerpoint/2010/main" val="553691324"/>
+        <p14:creationId xmlns:p14="http://schemas.microsoft.com/office/powerpoint/2010/main" val="1684223652"/>
       </p:ext>
     </p:extLst>
   </p:cSld>
@@ -7946,6 +7937,743 @@
         </p:nvSpPr>
         <p:spPr>
           <a:xfrm>
+            <a:off x="804672" y="640080"/>
+            <a:ext cx="3282696" cy="5257800"/>
+          </a:xfrm>
+        </p:spPr>
+        <p:txBody>
+          <a:bodyPr>
+            <a:normAutofit/>
+          </a:bodyPr>
+          <a:lstStyle/>
+          <a:p>
+            <a:r>
+              <a:rPr lang="en-US" dirty="0">
+                <a:solidFill>
+                  <a:schemeClr val="bg1"/>
+                </a:solidFill>
+                <a:latin typeface="Source Sans Pro" panose="020B0503030403020204" pitchFamily="34" charset="0"/>
+                <a:ea typeface="Source Sans Pro" panose="020B0503030403020204" pitchFamily="34" charset="0"/>
+              </a:rPr>
+              <a:t>Eagle Scout</a:t>
+            </a:r>
+          </a:p>
+        </p:txBody>
+      </p:sp>
+      <p:sp>
+        <p:nvSpPr>
+          <p:cNvPr id="33" name="Content Placeholder 2">
+            <a:extLst>
+              <a:ext uri="{FF2B5EF4-FFF2-40B4-BE49-F238E27FC236}">
+                <a16:creationId xmlns:a16="http://schemas.microsoft.com/office/drawing/2014/main" id="{9741FF26-BBDD-4A28-26F0-1785A26A82AD}"/>
+              </a:ext>
+            </a:extLst>
+          </p:cNvPr>
+          <p:cNvSpPr>
+            <a:spLocks noGrp="1"/>
+          </p:cNvSpPr>
+          <p:nvPr>
+            <p:ph idx="1"/>
+          </p:nvPr>
+        </p:nvSpPr>
+        <p:spPr>
+          <a:xfrm>
+            <a:off x="5358384" y="640081"/>
+            <a:ext cx="6024654" cy="5257800"/>
+          </a:xfrm>
+        </p:spPr>
+        <p:txBody>
+          <a:bodyPr anchor="ctr">
+            <a:normAutofit/>
+          </a:bodyPr>
+          <a:lstStyle/>
+          <a:p>
+            <a:pPr marL="342900" marR="0" lvl="0" indent="-342900" fontAlgn="base">
+              <a:spcBef>
+                <a:spcPts val="0"/>
+              </a:spcBef>
+              <a:spcAft>
+                <a:spcPts val="0"/>
+              </a:spcAft>
+              <a:buSzPts val="1000"/>
+              <a:buFont typeface="Symbol" pitchFamily="2" charset="2"/>
+              <a:buChar char=""/>
+              <a:tabLst>
+                <a:tab pos="457200" algn="l"/>
+              </a:tabLst>
+            </a:pPr>
+            <a:r>
+              <a:rPr lang="en-US" sz="2000" dirty="0">
+                <a:solidFill>
+                  <a:srgbClr val="000000"/>
+                </a:solidFill>
+                <a:effectLst/>
+                <a:latin typeface="Source Sans Pro" panose="020B0503030403020204" pitchFamily="34" charset="0"/>
+                <a:ea typeface="Source Sans Pro" panose="020B0503030403020204" pitchFamily="34" charset="0"/>
+                <a:cs typeface="Times New Roman" panose="02020603050405020304" pitchFamily="18" charset="0"/>
+              </a:rPr>
+              <a:t>Fulfillment of all BSA requirements</a:t>
+            </a:r>
+          </a:p>
+          <a:p>
+            <a:pPr marL="342900" marR="0" lvl="0" indent="-342900" fontAlgn="base">
+              <a:spcBef>
+                <a:spcPts val="0"/>
+              </a:spcBef>
+              <a:spcAft>
+                <a:spcPts val="0"/>
+              </a:spcAft>
+              <a:buSzPts val="1000"/>
+              <a:buFont typeface="Symbol" pitchFamily="2" charset="2"/>
+              <a:buChar char=""/>
+              <a:tabLst>
+                <a:tab pos="457200" algn="l"/>
+              </a:tabLst>
+            </a:pPr>
+            <a:endParaRPr lang="en-US" sz="2000" dirty="0">
+              <a:solidFill>
+                <a:srgbClr val="000000"/>
+              </a:solidFill>
+              <a:latin typeface="Source Sans Pro" panose="020B0503030403020204" pitchFamily="34" charset="0"/>
+              <a:ea typeface="Source Sans Pro" panose="020B0503030403020204" pitchFamily="34" charset="0"/>
+              <a:cs typeface="Times New Roman" panose="02020603050405020304" pitchFamily="18" charset="0"/>
+            </a:endParaRPr>
+          </a:p>
+          <a:p>
+            <a:pPr marL="342900" marR="0" lvl="0" indent="-342900" fontAlgn="base">
+              <a:spcBef>
+                <a:spcPts val="0"/>
+              </a:spcBef>
+              <a:spcAft>
+                <a:spcPts val="0"/>
+              </a:spcAft>
+              <a:buSzPts val="1000"/>
+              <a:buFont typeface="Symbol" pitchFamily="2" charset="2"/>
+              <a:buChar char=""/>
+              <a:tabLst>
+                <a:tab pos="457200" algn="l"/>
+              </a:tabLst>
+            </a:pPr>
+            <a:r>
+              <a:rPr lang="en-US" sz="2000" dirty="0">
+                <a:solidFill>
+                  <a:srgbClr val="000000"/>
+                </a:solidFill>
+                <a:effectLst/>
+                <a:latin typeface="Source Sans Pro" panose="020B0503030403020204" pitchFamily="34" charset="0"/>
+                <a:ea typeface="Source Sans Pro" panose="020B0503030403020204" pitchFamily="34" charset="0"/>
+                <a:cs typeface="Times New Roman" panose="02020603050405020304" pitchFamily="18" charset="0"/>
+              </a:rPr>
+              <a:t>24 merit badges</a:t>
+            </a:r>
+          </a:p>
+          <a:p>
+            <a:pPr marL="342900" marR="0" lvl="0" indent="-342900" fontAlgn="base">
+              <a:spcBef>
+                <a:spcPts val="0"/>
+              </a:spcBef>
+              <a:spcAft>
+                <a:spcPts val="0"/>
+              </a:spcAft>
+              <a:buSzPts val="1000"/>
+              <a:buFont typeface="Symbol" pitchFamily="2" charset="2"/>
+              <a:buChar char=""/>
+              <a:tabLst>
+                <a:tab pos="457200" algn="l"/>
+              </a:tabLst>
+            </a:pPr>
+            <a:endParaRPr lang="en-US" sz="2000" dirty="0">
+              <a:solidFill>
+                <a:srgbClr val="000000"/>
+              </a:solidFill>
+              <a:latin typeface="Source Sans Pro" panose="020B0503030403020204" pitchFamily="34" charset="0"/>
+              <a:ea typeface="Source Sans Pro" panose="020B0503030403020204" pitchFamily="34" charset="0"/>
+              <a:cs typeface="Times New Roman" panose="02020603050405020304" pitchFamily="18" charset="0"/>
+            </a:endParaRPr>
+          </a:p>
+          <a:p>
+            <a:pPr marL="342900" marR="0" lvl="0" indent="-342900" fontAlgn="base">
+              <a:spcBef>
+                <a:spcPts val="0"/>
+              </a:spcBef>
+              <a:spcAft>
+                <a:spcPts val="0"/>
+              </a:spcAft>
+              <a:buSzPts val="1000"/>
+              <a:buFont typeface="Symbol" pitchFamily="2" charset="2"/>
+              <a:buChar char=""/>
+              <a:tabLst>
+                <a:tab pos="457200" algn="l"/>
+              </a:tabLst>
+            </a:pPr>
+            <a:r>
+              <a:rPr lang="en-US" sz="2000" dirty="0">
+                <a:solidFill>
+                  <a:srgbClr val="000000"/>
+                </a:solidFill>
+                <a:latin typeface="Source Sans Pro" panose="020B0503030403020204" pitchFamily="34" charset="0"/>
+                <a:ea typeface="Source Sans Pro" panose="020B0503030403020204" pitchFamily="34" charset="0"/>
+                <a:cs typeface="Times New Roman" panose="02020603050405020304" pitchFamily="18" charset="0"/>
+              </a:rPr>
+              <a:t>O</a:t>
+            </a:r>
+            <a:r>
+              <a:rPr lang="en-US" sz="2000" dirty="0">
+                <a:solidFill>
+                  <a:srgbClr val="000000"/>
+                </a:solidFill>
+                <a:effectLst/>
+                <a:latin typeface="Source Sans Pro" panose="020B0503030403020204" pitchFamily="34" charset="0"/>
+                <a:ea typeface="Source Sans Pro" panose="020B0503030403020204" pitchFamily="34" charset="0"/>
+                <a:cs typeface="Times New Roman" panose="02020603050405020304" pitchFamily="18" charset="0"/>
+              </a:rPr>
+              <a:t>ver 3 years of leadership experience at both small scale (leading a unit of 7-10 boys) and large scale (managing a troop of 60+ boys and 20+ adults)</a:t>
+            </a:r>
+          </a:p>
+          <a:p>
+            <a:pPr marL="342900" marR="0" lvl="0" indent="-342900" fontAlgn="base">
+              <a:spcBef>
+                <a:spcPts val="0"/>
+              </a:spcBef>
+              <a:spcAft>
+                <a:spcPts val="0"/>
+              </a:spcAft>
+              <a:buSzPts val="1000"/>
+              <a:buFont typeface="Symbol" pitchFamily="2" charset="2"/>
+              <a:buChar char=""/>
+              <a:tabLst>
+                <a:tab pos="457200" algn="l"/>
+              </a:tabLst>
+            </a:pPr>
+            <a:endParaRPr lang="en-US" sz="2000" dirty="0">
+              <a:solidFill>
+                <a:srgbClr val="000000"/>
+              </a:solidFill>
+              <a:effectLst/>
+              <a:latin typeface="Source Sans Pro" panose="020B0503030403020204" pitchFamily="34" charset="0"/>
+              <a:ea typeface="Source Sans Pro" panose="020B0503030403020204" pitchFamily="34" charset="0"/>
+              <a:cs typeface="Times New Roman" panose="02020603050405020304" pitchFamily="18" charset="0"/>
+            </a:endParaRPr>
+          </a:p>
+          <a:p>
+            <a:pPr marL="342900" marR="0" lvl="0" indent="-342900" fontAlgn="base">
+              <a:spcBef>
+                <a:spcPts val="0"/>
+              </a:spcBef>
+              <a:spcAft>
+                <a:spcPts val="0"/>
+              </a:spcAft>
+              <a:buSzPts val="1000"/>
+              <a:buFont typeface="Symbol" pitchFamily="2" charset="2"/>
+              <a:buChar char=""/>
+              <a:tabLst>
+                <a:tab pos="457200" algn="l"/>
+              </a:tabLst>
+            </a:pPr>
+            <a:r>
+              <a:rPr lang="en-US" sz="2000" dirty="0">
+                <a:solidFill>
+                  <a:srgbClr val="000000"/>
+                </a:solidFill>
+                <a:effectLst/>
+                <a:latin typeface="Source Sans Pro" panose="020B0503030403020204" pitchFamily="34" charset="0"/>
+                <a:ea typeface="Source Sans Pro" panose="020B0503030403020204" pitchFamily="34" charset="0"/>
+              </a:rPr>
+              <a:t>Innovated, coordinated, led, and executed 100+ hour project to help local Alzheimer’s patients</a:t>
+            </a:r>
+            <a:r>
+              <a:rPr lang="en-US" sz="2000" dirty="0">
+                <a:effectLst/>
+                <a:latin typeface="Source Sans Pro" panose="020B0503030403020204" pitchFamily="34" charset="0"/>
+                <a:ea typeface="Source Sans Pro" panose="020B0503030403020204" pitchFamily="34" charset="0"/>
+              </a:rPr>
+              <a:t> </a:t>
+            </a:r>
+            <a:endParaRPr lang="en-US" sz="2000" dirty="0">
+              <a:effectLst/>
+              <a:latin typeface="Source Sans Pro" panose="020B0503030403020204" pitchFamily="34" charset="0"/>
+              <a:ea typeface="Source Sans Pro" panose="020B0503030403020204" pitchFamily="34" charset="0"/>
+              <a:cs typeface="Times New Roman" panose="02020603050405020304" pitchFamily="18" charset="0"/>
+            </a:endParaRPr>
+          </a:p>
+        </p:txBody>
+      </p:sp>
+      <p:sp>
+        <p:nvSpPr>
+          <p:cNvPr id="17" name="TextBox 16">
+            <a:extLst>
+              <a:ext uri="{FF2B5EF4-FFF2-40B4-BE49-F238E27FC236}">
+                <a16:creationId xmlns:a16="http://schemas.microsoft.com/office/drawing/2014/main" id="{88FA8BC0-0702-D4C8-3F3B-A680C5702245}"/>
+              </a:ext>
+            </a:extLst>
+          </p:cNvPr>
+          <p:cNvSpPr txBox="1"/>
+          <p:nvPr/>
+        </p:nvSpPr>
+        <p:spPr>
+          <a:xfrm>
+            <a:off x="804672" y="3633221"/>
+            <a:ext cx="3612583" cy="369332"/>
+          </a:xfrm>
+          <a:prstGeom prst="rect">
+            <a:avLst/>
+          </a:prstGeom>
+          <a:noFill/>
+        </p:spPr>
+        <p:txBody>
+          <a:bodyPr wrap="square" rtlCol="0">
+            <a:spAutoFit/>
+          </a:bodyPr>
+          <a:lstStyle/>
+          <a:p>
+            <a:r>
+              <a:rPr lang="en-US" dirty="0">
+                <a:solidFill>
+                  <a:schemeClr val="bg1"/>
+                </a:solidFill>
+                <a:latin typeface="Source Sans Pro" panose="020B0503030403020204" pitchFamily="34" charset="0"/>
+                <a:ea typeface="Source Sans Pro" panose="020B0503030403020204" pitchFamily="34" charset="0"/>
+              </a:rPr>
+              <a:t>BSA Troop 1 | Huntington Beach, CA</a:t>
+            </a:r>
+          </a:p>
+        </p:txBody>
+      </p:sp>
+      <p:sp>
+        <p:nvSpPr>
+          <p:cNvPr id="19" name="TextBox 18">
+            <a:extLst>
+              <a:ext uri="{FF2B5EF4-FFF2-40B4-BE49-F238E27FC236}">
+                <a16:creationId xmlns:a16="http://schemas.microsoft.com/office/drawing/2014/main" id="{5C924682-A0E5-2B4A-BCBE-9797662838AA}"/>
+              </a:ext>
+            </a:extLst>
+          </p:cNvPr>
+          <p:cNvSpPr txBox="1"/>
+          <p:nvPr/>
+        </p:nvSpPr>
+        <p:spPr>
+          <a:xfrm>
+            <a:off x="8370711" y="6250857"/>
+            <a:ext cx="3721725" cy="461665"/>
+          </a:xfrm>
+          <a:prstGeom prst="rect">
+            <a:avLst/>
+          </a:prstGeom>
+          <a:noFill/>
+        </p:spPr>
+        <p:txBody>
+          <a:bodyPr wrap="square" rtlCol="0">
+            <a:spAutoFit/>
+          </a:bodyPr>
+          <a:lstStyle/>
+          <a:p>
+            <a:pPr marL="0" marR="0" algn="r">
+              <a:spcBef>
+                <a:spcPts val="0"/>
+              </a:spcBef>
+              <a:spcAft>
+                <a:spcPts val="0"/>
+              </a:spcAft>
+            </a:pPr>
+            <a:r>
+              <a:rPr lang="en-US" sz="2400" b="1" dirty="0">
+                <a:solidFill>
+                  <a:srgbClr val="000000"/>
+                </a:solidFill>
+                <a:effectLst/>
+                <a:latin typeface="Source Sans Pro" panose="020B0503030403020204" pitchFamily="34" charset="0"/>
+                <a:ea typeface="Source Sans Pro" panose="020B0503030403020204" pitchFamily="34" charset="0"/>
+                <a:cs typeface="Times New Roman" panose="02020603050405020304" pitchFamily="18" charset="0"/>
+              </a:rPr>
+              <a:t>Awarded September 2019</a:t>
+            </a:r>
+            <a:endParaRPr lang="en-US" sz="2400" dirty="0">
+              <a:effectLst/>
+              <a:latin typeface="Source Sans Pro" panose="020B0503030403020204" pitchFamily="34" charset="0"/>
+              <a:ea typeface="Source Sans Pro" panose="020B0503030403020204" pitchFamily="34" charset="0"/>
+              <a:cs typeface="Times New Roman" panose="02020603050405020304" pitchFamily="18" charset="0"/>
+            </a:endParaRPr>
+          </a:p>
+        </p:txBody>
+      </p:sp>
+    </p:spTree>
+    <p:extLst>
+      <p:ext uri="{BB962C8B-B14F-4D97-AF65-F5344CB8AC3E}">
+        <p14:creationId xmlns:p14="http://schemas.microsoft.com/office/powerpoint/2010/main" val="553691324"/>
+      </p:ext>
+    </p:extLst>
+  </p:cSld>
+  <p:clrMapOvr>
+    <a:masterClrMapping/>
+  </p:clrMapOvr>
+</p:sld>
+</file>
+
+<file path=ppt/slides/slide8.xml><?xml version="1.0" encoding="utf-8"?>
+<p:sld xmlns:a="http://schemas.openxmlformats.org/drawingml/2006/main" xmlns:r="http://schemas.openxmlformats.org/officeDocument/2006/relationships" xmlns:p="http://schemas.openxmlformats.org/presentationml/2006/main">
+  <p:cSld>
+    <p:bg>
+      <p:bgPr>
+        <a:solidFill>
+          <a:schemeClr val="bg1"/>
+        </a:solidFill>
+        <a:effectLst/>
+      </p:bgPr>
+    </p:bg>
+    <p:spTree>
+      <p:nvGrpSpPr>
+        <p:cNvPr id="1" name=""/>
+        <p:cNvGrpSpPr/>
+        <p:nvPr/>
+      </p:nvGrpSpPr>
+      <p:grpSpPr>
+        <a:xfrm>
+          <a:off x="0" y="0"/>
+          <a:ext cx="0" cy="0"/>
+          <a:chOff x="0" y="0"/>
+          <a:chExt cx="0" cy="0"/>
+        </a:xfrm>
+      </p:grpSpPr>
+      <p:sp useBgFill="1">
+        <p:nvSpPr>
+          <p:cNvPr id="8" name="Rectangle 7">
+            <a:extLst>
+              <a:ext uri="{FF2B5EF4-FFF2-40B4-BE49-F238E27FC236}">
+                <a16:creationId xmlns:a16="http://schemas.microsoft.com/office/drawing/2014/main" id="{C7FA33FF-088D-4F16-95A2-2C64D353DEA8}"/>
+              </a:ext>
+              <a:ext uri="{C183D7F6-B498-43B3-948B-1728B52AA6E4}">
+                <adec:decorative xmlns:adec="http://schemas.microsoft.com/office/drawing/2017/decorative" val="1"/>
+              </a:ext>
+            </a:extLst>
+          </p:cNvPr>
+          <p:cNvSpPr>
+            <a:spLocks noGrp="1" noRot="1" noChangeAspect="1" noMove="1" noResize="1" noEditPoints="1" noAdjustHandles="1" noChangeArrowheads="1" noChangeShapeType="1" noTextEdit="1"/>
+          </p:cNvSpPr>
+          <p:nvPr>
+            <p:extLst>
+              <p:ext uri="{386F3935-93C4-4BCD-93E2-E3B085C9AB24}">
+                <p16:designElem xmlns:p16="http://schemas.microsoft.com/office/powerpoint/2015/main" val="1"/>
+              </p:ext>
+            </p:extLst>
+          </p:nvPr>
+        </p:nvSpPr>
+        <p:spPr>
+          <a:xfrm>
+            <a:off x="1524" y="0"/>
+            <a:ext cx="12188952" cy="6858000"/>
+          </a:xfrm>
+          <a:prstGeom prst="rect">
+            <a:avLst/>
+          </a:prstGeom>
+          <a:ln>
+            <a:noFill/>
+          </a:ln>
+        </p:spPr>
+        <p:style>
+          <a:lnRef idx="2">
+            <a:schemeClr val="accent1">
+              <a:shade val="50000"/>
+            </a:schemeClr>
+          </a:lnRef>
+          <a:fillRef idx="1">
+            <a:schemeClr val="accent1"/>
+          </a:fillRef>
+          <a:effectRef idx="0">
+            <a:schemeClr val="accent1"/>
+          </a:effectRef>
+          <a:fontRef idx="minor">
+            <a:schemeClr val="lt1"/>
+          </a:fontRef>
+        </p:style>
+        <p:txBody>
+          <a:bodyPr rtlCol="0" anchor="ctr"/>
+          <a:lstStyle/>
+          <a:p>
+            <a:pPr marL="0" marR="0" lvl="0" indent="0" algn="ctr" defTabSz="914400" rtl="0" eaLnBrk="1" fontAlgn="auto" latinLnBrk="0" hangingPunct="1">
+              <a:lnSpc>
+                <a:spcPct val="100000"/>
+              </a:lnSpc>
+              <a:spcBef>
+                <a:spcPts val="0"/>
+              </a:spcBef>
+              <a:spcAft>
+                <a:spcPts val="0"/>
+              </a:spcAft>
+              <a:buClrTx/>
+              <a:buSzTx/>
+              <a:buFontTx/>
+              <a:buNone/>
+              <a:tabLst/>
+              <a:defRPr/>
+            </a:pPr>
+            <a:endParaRPr kumimoji="0" lang="en-US" sz="1800" b="0" i="0" u="none" strike="noStrike" kern="1200" cap="none" spc="0" normalizeH="0" baseline="0" noProof="0">
+              <a:ln>
+                <a:noFill/>
+              </a:ln>
+              <a:solidFill>
+                <a:prstClr val="white"/>
+              </a:solidFill>
+              <a:effectLst/>
+              <a:uLnTx/>
+              <a:uFillTx/>
+              <a:latin typeface="Calibri" panose="020F0502020204030204"/>
+              <a:ea typeface="+mn-ea"/>
+              <a:cs typeface="+mn-cs"/>
+            </a:endParaRPr>
+          </a:p>
+        </p:txBody>
+      </p:sp>
+      <p:sp>
+        <p:nvSpPr>
+          <p:cNvPr id="10" name="Rectangle 9">
+            <a:extLst>
+              <a:ext uri="{FF2B5EF4-FFF2-40B4-BE49-F238E27FC236}">
+                <a16:creationId xmlns:a16="http://schemas.microsoft.com/office/drawing/2014/main" id="{A376EFB1-01CF-419F-ABF1-2AF02BBFCBD1}"/>
+              </a:ext>
+              <a:ext uri="{C183D7F6-B498-43B3-948B-1728B52AA6E4}">
+                <adec:decorative xmlns:adec="http://schemas.microsoft.com/office/drawing/2017/decorative" val="1"/>
+              </a:ext>
+            </a:extLst>
+          </p:cNvPr>
+          <p:cNvSpPr>
+            <a:spLocks noGrp="1" noRot="1" noChangeAspect="1" noMove="1" noResize="1" noEditPoints="1" noAdjustHandles="1" noChangeArrowheads="1" noChangeShapeType="1" noTextEdit="1"/>
+          </p:cNvSpPr>
+          <p:nvPr>
+            <p:extLst>
+              <p:ext uri="{386F3935-93C4-4BCD-93E2-E3B085C9AB24}">
+                <p16:designElem xmlns:p16="http://schemas.microsoft.com/office/powerpoint/2015/main" val="1"/>
+              </p:ext>
+            </p:extLst>
+          </p:nvPr>
+        </p:nvSpPr>
+        <p:spPr>
+          <a:xfrm>
+            <a:off x="0" y="0"/>
+            <a:ext cx="4709160" cy="6858000"/>
+          </a:xfrm>
+          <a:prstGeom prst="rect">
+            <a:avLst/>
+          </a:prstGeom>
+          <a:solidFill>
+            <a:schemeClr val="tx1">
+              <a:alpha val="81000"/>
+            </a:schemeClr>
+          </a:solidFill>
+          <a:ln>
+            <a:noFill/>
+          </a:ln>
+        </p:spPr>
+        <p:style>
+          <a:lnRef idx="2">
+            <a:schemeClr val="accent1">
+              <a:shade val="50000"/>
+            </a:schemeClr>
+          </a:lnRef>
+          <a:fillRef idx="1">
+            <a:schemeClr val="accent1"/>
+          </a:fillRef>
+          <a:effectRef idx="0">
+            <a:schemeClr val="accent1"/>
+          </a:effectRef>
+          <a:fontRef idx="minor">
+            <a:schemeClr val="lt1"/>
+          </a:fontRef>
+        </p:style>
+        <p:txBody>
+          <a:bodyPr rtlCol="0" anchor="ctr"/>
+          <a:lstStyle/>
+          <a:p>
+            <a:pPr marL="0" marR="0" lvl="0" indent="0" algn="ctr" defTabSz="914400" rtl="0" eaLnBrk="1" fontAlgn="auto" latinLnBrk="0" hangingPunct="1">
+              <a:lnSpc>
+                <a:spcPct val="100000"/>
+              </a:lnSpc>
+              <a:spcBef>
+                <a:spcPts val="0"/>
+              </a:spcBef>
+              <a:spcAft>
+                <a:spcPts val="0"/>
+              </a:spcAft>
+              <a:buClrTx/>
+              <a:buSzTx/>
+              <a:buFontTx/>
+              <a:buNone/>
+              <a:tabLst/>
+              <a:defRPr/>
+            </a:pPr>
+            <a:endParaRPr kumimoji="0" lang="en-US" sz="1800" b="0" i="0" u="none" strike="noStrike" kern="1200" cap="none" spc="0" normalizeH="0" baseline="0" noProof="0">
+              <a:ln>
+                <a:noFill/>
+              </a:ln>
+              <a:solidFill>
+                <a:prstClr val="white"/>
+              </a:solidFill>
+              <a:effectLst/>
+              <a:uLnTx/>
+              <a:uFillTx/>
+              <a:latin typeface="Calibri" panose="020F0502020204030204"/>
+              <a:ea typeface="+mn-ea"/>
+              <a:cs typeface="+mn-cs"/>
+            </a:endParaRPr>
+          </a:p>
+        </p:txBody>
+      </p:sp>
+      <p:sp>
+        <p:nvSpPr>
+          <p:cNvPr id="12" name="Freeform: Shape 11">
+            <a:extLst>
+              <a:ext uri="{FF2B5EF4-FFF2-40B4-BE49-F238E27FC236}">
+                <a16:creationId xmlns:a16="http://schemas.microsoft.com/office/drawing/2014/main" id="{FF9DEA15-78BD-4750-AA18-B9F28A6D5AB8}"/>
+              </a:ext>
+              <a:ext uri="{C183D7F6-B498-43B3-948B-1728B52AA6E4}">
+                <adec:decorative xmlns:adec="http://schemas.microsoft.com/office/drawing/2017/decorative" val="1"/>
+              </a:ext>
+            </a:extLst>
+          </p:cNvPr>
+          <p:cNvSpPr>
+            <a:spLocks noGrp="1" noRot="1" noChangeAspect="1" noMove="1" noResize="1" noEditPoints="1" noAdjustHandles="1" noChangeArrowheads="1" noChangeShapeType="1" noTextEdit="1"/>
+          </p:cNvSpPr>
+          <p:nvPr>
+            <p:extLst>
+              <p:ext uri="{386F3935-93C4-4BCD-93E2-E3B085C9AB24}">
+                <p16:designElem xmlns:p16="http://schemas.microsoft.com/office/powerpoint/2015/main" val="1"/>
+              </p:ext>
+            </p:extLst>
+          </p:nvPr>
+        </p:nvSpPr>
+        <p:spPr>
+          <a:xfrm>
+            <a:off x="0" y="0"/>
+            <a:ext cx="3284331" cy="6858000"/>
+          </a:xfrm>
+          <a:custGeom>
+            <a:avLst/>
+            <a:gdLst>
+              <a:gd name="connsiteX0" fmla="*/ 0 w 4319042"/>
+              <a:gd name="connsiteY0" fmla="*/ 0 h 6858000"/>
+              <a:gd name="connsiteX1" fmla="*/ 1142888 w 4319042"/>
+              <a:gd name="connsiteY1" fmla="*/ 0 h 6858000"/>
+              <a:gd name="connsiteX2" fmla="*/ 4319042 w 4319042"/>
+              <a:gd name="connsiteY2" fmla="*/ 6858000 h 6858000"/>
+              <a:gd name="connsiteX3" fmla="*/ 0 w 4319042"/>
+              <a:gd name="connsiteY3" fmla="*/ 6858000 h 6858000"/>
+            </a:gdLst>
+            <a:ahLst/>
+            <a:cxnLst>
+              <a:cxn ang="0">
+                <a:pos x="connsiteX0" y="connsiteY0"/>
+              </a:cxn>
+              <a:cxn ang="0">
+                <a:pos x="connsiteX1" y="connsiteY1"/>
+              </a:cxn>
+              <a:cxn ang="0">
+                <a:pos x="connsiteX2" y="connsiteY2"/>
+              </a:cxn>
+              <a:cxn ang="0">
+                <a:pos x="connsiteX3" y="connsiteY3"/>
+              </a:cxn>
+            </a:cxnLst>
+            <a:rect l="l" t="t" r="r" b="b"/>
+            <a:pathLst>
+              <a:path w="4319042" h="6858000">
+                <a:moveTo>
+                  <a:pt x="0" y="0"/>
+                </a:moveTo>
+                <a:lnTo>
+                  <a:pt x="1142888" y="0"/>
+                </a:lnTo>
+                <a:lnTo>
+                  <a:pt x="4319042" y="6858000"/>
+                </a:lnTo>
+                <a:lnTo>
+                  <a:pt x="0" y="6858000"/>
+                </a:lnTo>
+                <a:close/>
+              </a:path>
+            </a:pathLst>
+          </a:custGeom>
+          <a:solidFill>
+            <a:schemeClr val="tx1">
+              <a:alpha val="35000"/>
+            </a:schemeClr>
+          </a:solidFill>
+          <a:ln>
+            <a:noFill/>
+          </a:ln>
+        </p:spPr>
+        <p:style>
+          <a:lnRef idx="2">
+            <a:schemeClr val="accent1">
+              <a:shade val="50000"/>
+            </a:schemeClr>
+          </a:lnRef>
+          <a:fillRef idx="1">
+            <a:schemeClr val="accent1"/>
+          </a:fillRef>
+          <a:effectRef idx="0">
+            <a:schemeClr val="accent1"/>
+          </a:effectRef>
+          <a:fontRef idx="minor">
+            <a:schemeClr val="lt1"/>
+          </a:fontRef>
+        </p:style>
+        <p:txBody>
+          <a:bodyPr wrap="square" rtlCol="0" anchor="ctr">
+            <a:noAutofit/>
+          </a:bodyPr>
+          <a:lstStyle/>
+          <a:p>
+            <a:pPr marL="0" marR="0" lvl="0" indent="0" algn="ctr" defTabSz="914400" rtl="0" eaLnBrk="1" fontAlgn="auto" latinLnBrk="0" hangingPunct="1">
+              <a:lnSpc>
+                <a:spcPct val="100000"/>
+              </a:lnSpc>
+              <a:spcBef>
+                <a:spcPts val="0"/>
+              </a:spcBef>
+              <a:spcAft>
+                <a:spcPts val="0"/>
+              </a:spcAft>
+              <a:buClrTx/>
+              <a:buSzTx/>
+              <a:buFontTx/>
+              <a:buNone/>
+              <a:tabLst/>
+              <a:defRPr/>
+            </a:pPr>
+            <a:endParaRPr kumimoji="0" lang="en-US" sz="1800" b="0" i="0" u="none" strike="noStrike" kern="1200" cap="none" spc="0" normalizeH="0" baseline="0" noProof="0">
+              <a:ln>
+                <a:noFill/>
+              </a:ln>
+              <a:solidFill>
+                <a:prstClr val="white"/>
+              </a:solidFill>
+              <a:effectLst/>
+              <a:uLnTx/>
+              <a:uFillTx/>
+              <a:latin typeface="Calibri" panose="020F0502020204030204"/>
+              <a:ea typeface="+mn-ea"/>
+              <a:cs typeface="+mn-cs"/>
+            </a:endParaRPr>
+          </a:p>
+        </p:txBody>
+      </p:sp>
+      <p:sp>
+        <p:nvSpPr>
+          <p:cNvPr id="2" name="Title 1">
+            <a:extLst>
+              <a:ext uri="{FF2B5EF4-FFF2-40B4-BE49-F238E27FC236}">
+                <a16:creationId xmlns:a16="http://schemas.microsoft.com/office/drawing/2014/main" id="{641F7249-356B-E00C-5B30-B265726CAC26}"/>
+              </a:ext>
+            </a:extLst>
+          </p:cNvPr>
+          <p:cNvSpPr>
+            <a:spLocks noGrp="1"/>
+          </p:cNvSpPr>
+          <p:nvPr>
+            <p:ph type="title"/>
+          </p:nvPr>
+        </p:nvSpPr>
+        <p:spPr>
+          <a:xfrm>
             <a:off x="804671" y="640080"/>
             <a:ext cx="3522779" cy="5257800"/>
           </a:xfrm>
@@ -8223,7 +8951,7 @@
 </p:sld>
 </file>
 
-<file path=ppt/slides/slide8.xml><?xml version="1.0" encoding="utf-8"?>
+<file path=ppt/slides/slide9.xml><?xml version="1.0" encoding="utf-8"?>
 <p:sld xmlns:a="http://schemas.openxmlformats.org/drawingml/2006/main" xmlns:r="http://schemas.openxmlformats.org/officeDocument/2006/relationships" xmlns:p="http://schemas.openxmlformats.org/presentationml/2006/main">
   <p:cSld>
     <p:bg>

</xml_diff>